<commit_message>
IWAST bijwerking obv feedback
</commit_message>
<xml_diff>
--- a/assets/files/IWAST-bijscholingsmoment.pptx
+++ b/assets/files/IWAST-bijscholingsmoment.pptx
@@ -6,10 +6,10 @@
     <p:sldMasterId id="2147483694" r:id="rId2"/>
   </p:sldMasterIdLst>
   <p:notesMasterIdLst>
-    <p:notesMasterId r:id="rId24"/>
+    <p:notesMasterId r:id="rId27"/>
   </p:notesMasterIdLst>
   <p:handoutMasterIdLst>
-    <p:handoutMasterId r:id="rId25"/>
+    <p:handoutMasterId r:id="rId28"/>
   </p:handoutMasterIdLst>
   <p:sldIdLst>
     <p:sldId id="261" r:id="rId3"/>
@@ -20,19 +20,22 @@
     <p:sldId id="265" r:id="rId8"/>
     <p:sldId id="266" r:id="rId9"/>
     <p:sldId id="269" r:id="rId10"/>
-    <p:sldId id="267" r:id="rId11"/>
-    <p:sldId id="270" r:id="rId12"/>
-    <p:sldId id="271" r:id="rId13"/>
-    <p:sldId id="272" r:id="rId14"/>
-    <p:sldId id="277" r:id="rId15"/>
-    <p:sldId id="278" r:id="rId16"/>
-    <p:sldId id="273" r:id="rId17"/>
-    <p:sldId id="279" r:id="rId18"/>
-    <p:sldId id="274" r:id="rId19"/>
-    <p:sldId id="280" r:id="rId20"/>
-    <p:sldId id="275" r:id="rId21"/>
-    <p:sldId id="281" r:id="rId22"/>
-    <p:sldId id="276" r:id="rId23"/>
+    <p:sldId id="282" r:id="rId11"/>
+    <p:sldId id="284" r:id="rId12"/>
+    <p:sldId id="267" r:id="rId13"/>
+    <p:sldId id="270" r:id="rId14"/>
+    <p:sldId id="271" r:id="rId15"/>
+    <p:sldId id="272" r:id="rId16"/>
+    <p:sldId id="277" r:id="rId17"/>
+    <p:sldId id="278" r:id="rId18"/>
+    <p:sldId id="285" r:id="rId19"/>
+    <p:sldId id="273" r:id="rId20"/>
+    <p:sldId id="279" r:id="rId21"/>
+    <p:sldId id="274" r:id="rId22"/>
+    <p:sldId id="280" r:id="rId23"/>
+    <p:sldId id="275" r:id="rId24"/>
+    <p:sldId id="281" r:id="rId25"/>
+    <p:sldId id="276" r:id="rId26"/>
   </p:sldIdLst>
   <p:sldSz cx="12192000" cy="6858000"/>
   <p:notesSz cx="6858000" cy="9144000"/>
@@ -224,7 +227,7 @@
           <a:p>
             <a:fld id="{8F591CCF-F6FD-734B-854A-5BC033593B1E}" type="datetimeFigureOut">
               <a:rPr lang="nl-NL" smtClean="0"/>
-              <a:t>27-8-2021</a:t>
+              <a:t>22-9-2021</a:t>
             </a:fld>
             <a:endParaRPr lang="nl-NL"/>
           </a:p>
@@ -389,7 +392,7 @@
           <a:p>
             <a:fld id="{23C66214-DB21-4647-B5DA-0D17CA592867}" type="datetimeFigureOut">
               <a:rPr lang="nl-NL" smtClean="0"/>
-              <a:t>27-8-2021</a:t>
+              <a:t>22-9-2021</a:t>
             </a:fld>
             <a:endParaRPr lang="nl-NL"/>
           </a:p>
@@ -1380,7 +1383,7 @@
           <a:p>
             <a:fld id="{2C71BA47-52C5-47BB-8222-E91DF5D20787}" type="datetime1">
               <a:rPr lang="nl-BE" smtClean="0"/>
-              <a:t>27/08/2021</a:t>
+              <a:t>22/09/2021</a:t>
             </a:fld>
             <a:endParaRPr lang="nl-NL"/>
           </a:p>
@@ -1664,7 +1667,7 @@
           <a:p>
             <a:fld id="{2FEB6D52-39FF-4DDC-ABA2-DD9B4669A9B6}" type="datetime1">
               <a:rPr lang="nl-BE" smtClean="0"/>
-              <a:t>27/08/2021</a:t>
+              <a:t>22/09/2021</a:t>
             </a:fld>
             <a:endParaRPr lang="nl-NL"/>
           </a:p>
@@ -1996,7 +1999,7 @@
           <a:p>
             <a:fld id="{92880460-E3E2-4A32-B010-8E868E7D8CFD}" type="datetime1">
               <a:rPr lang="nl-BE" smtClean="0"/>
-              <a:t>27/08/2021</a:t>
+              <a:t>22/09/2021</a:t>
             </a:fld>
             <a:endParaRPr lang="nl-NL"/>
           </a:p>
@@ -2317,7 +2320,7 @@
           <a:p>
             <a:fld id="{8BDB0A70-4029-4D60-9A27-8153D062C398}" type="datetime1">
               <a:rPr lang="nl-BE" smtClean="0"/>
-              <a:t>27/08/2021</a:t>
+              <a:t>22/09/2021</a:t>
             </a:fld>
             <a:endParaRPr lang="nl-NL" dirty="0"/>
           </a:p>
@@ -2639,7 +2642,7 @@
           <a:p>
             <a:fld id="{D191271C-0671-4065-B611-A85473029A3A}" type="datetime1">
               <a:rPr lang="nl-BE" smtClean="0"/>
-              <a:t>27/08/2021</a:t>
+              <a:t>22/09/2021</a:t>
             </a:fld>
             <a:endParaRPr lang="nl-NL" dirty="0"/>
           </a:p>
@@ -2782,7 +2785,7 @@
           <a:p>
             <a:fld id="{C2979C42-1016-4227-972D-D2170CB25ABA}" type="datetime1">
               <a:rPr lang="nl-BE" smtClean="0"/>
-              <a:t>27/08/2021</a:t>
+              <a:t>22/09/2021</a:t>
             </a:fld>
             <a:endParaRPr lang="nl-NL"/>
           </a:p>
@@ -3267,7 +3270,7 @@
           <a:p>
             <a:fld id="{C151225D-C070-4332-B04F-40B6DBB92F88}" type="datetime1">
               <a:rPr lang="nl-BE" smtClean="0"/>
-              <a:t>27/08/2021</a:t>
+              <a:t>22/09/2021</a:t>
             </a:fld>
             <a:endParaRPr lang="nl-NL" dirty="0"/>
           </a:p>
@@ -3389,7 +3392,7 @@
           <a:p>
             <a:fld id="{4765BD74-6176-4D14-A82C-CF7AA8CEE67B}" type="datetime1">
               <a:rPr lang="nl-BE" smtClean="0"/>
-              <a:t>27/08/2021</a:t>
+              <a:t>22/09/2021</a:t>
             </a:fld>
             <a:endParaRPr lang="nl-NL"/>
           </a:p>
@@ -3511,7 +3514,7 @@
           <a:p>
             <a:fld id="{A43878EE-CBAC-4D55-8B06-CB6D4F5064DA}" type="datetime1">
               <a:rPr lang="nl-BE" smtClean="0"/>
-              <a:t>27/08/2021</a:t>
+              <a:t>22/09/2021</a:t>
             </a:fld>
             <a:endParaRPr lang="nl-NL"/>
           </a:p>
@@ -3694,7 +3697,7 @@
           <a:p>
             <a:fld id="{81FE72EC-EE2C-486F-9DAA-1F302E3F0291}" type="datetime1">
               <a:rPr lang="nl-BE" smtClean="0"/>
-              <a:t>27/08/2021</a:t>
+              <a:t>22/09/2021</a:t>
             </a:fld>
             <a:endParaRPr lang="nl-NL" dirty="0"/>
           </a:p>
@@ -3981,7 +3984,7 @@
           <a:p>
             <a:fld id="{68B84DB0-B6A9-48D9-A086-A3E5FC5D790F}" type="datetime1">
               <a:rPr lang="nl-BE" smtClean="0"/>
-              <a:t>27/08/2021</a:t>
+              <a:t>22/09/2021</a:t>
             </a:fld>
             <a:endParaRPr lang="nl-NL" dirty="0"/>
           </a:p>
@@ -4624,7 +4627,7 @@
           <a:p>
             <a:fld id="{126EDFC9-25A4-4025-B417-B73F605F31CA}" type="datetime1">
               <a:rPr lang="nl-BE" smtClean="0"/>
-              <a:t>27/08/2021</a:t>
+              <a:t>22/09/2021</a:t>
             </a:fld>
             <a:endParaRPr lang="nl-NL" dirty="0"/>
           </a:p>
@@ -5198,29 +5201,6 @@
       </p:grpSpPr>
       <p:sp>
         <p:nvSpPr>
-          <p:cNvPr id="2" name="Tijdelijke aanduiding voor inhoud 1"/>
-          <p:cNvSpPr>
-            <a:spLocks noGrp="1"/>
-          </p:cNvSpPr>
-          <p:nvPr>
-            <p:ph idx="1"/>
-          </p:nvPr>
-        </p:nvSpPr>
-        <p:spPr/>
-        <p:txBody>
-          <a:bodyPr/>
-          <a:lstStyle/>
-          <a:p>
-            <a:r>
-              <a:rPr lang="nl-NL" dirty="0" smtClean="0"/>
-              <a:t>Zie website</a:t>
-            </a:r>
-            <a:endParaRPr lang="nl-BE" dirty="0"/>
-          </a:p>
-        </p:txBody>
-      </p:sp>
-      <p:sp>
-        <p:nvSpPr>
           <p:cNvPr id="3" name="Tijdelijke aanduiding voor voettekst 2"/>
           <p:cNvSpPr>
             <a:spLocks noGrp="1"/>
@@ -5281,17 +5261,48 @@
           <a:lstStyle/>
           <a:p>
             <a:r>
-              <a:rPr lang="nl-NL" dirty="0" smtClean="0"/>
-              <a:t>Uitdaging</a:t>
+              <a:rPr lang="nl-NL" dirty="0" err="1" smtClean="0"/>
+              <a:t>IoT</a:t>
             </a:r>
             <a:endParaRPr lang="nl-BE" dirty="0"/>
           </a:p>
         </p:txBody>
       </p:sp>
+      <p:pic>
+        <p:nvPicPr>
+          <p:cNvPr id="6" name="Tijdelijke aanduiding voor inhoud 5">
+            <a:extLst>
+              <a:ext uri="{FF2B5EF4-FFF2-40B4-BE49-F238E27FC236}">
+                <a16:creationId xmlns:a16="http://schemas.microsoft.com/office/drawing/2014/main" id="{4CA82B4B-82EF-4EFE-B2EA-5CB87BA58669}"/>
+              </a:ext>
+            </a:extLst>
+          </p:cNvPr>
+          <p:cNvPicPr>
+            <a:picLocks noGrp="1" noChangeAspect="1"/>
+          </p:cNvPicPr>
+          <p:nvPr>
+            <p:ph idx="1"/>
+          </p:nvPr>
+        </p:nvPicPr>
+        <p:blipFill rotWithShape="1">
+          <a:blip r:embed="rId2"/>
+          <a:srcRect l="3364" t="-454" r="4236" b="5699"/>
+          <a:stretch/>
+        </p:blipFill>
+        <p:spPr>
+          <a:xfrm>
+            <a:off x="2841343" y="1552493"/>
+            <a:ext cx="6384513" cy="4464050"/>
+          </a:xfrm>
+          <a:prstGeom prst="rect">
+            <a:avLst/>
+          </a:prstGeom>
+        </p:spPr>
+      </p:pic>
     </p:spTree>
     <p:extLst>
       <p:ext uri="{BB962C8B-B14F-4D97-AF65-F5344CB8AC3E}">
-        <p14:creationId xmlns:p14="http://schemas.microsoft.com/office/powerpoint/2010/main" val="2157535991"/>
+        <p14:creationId xmlns:p14="http://schemas.microsoft.com/office/powerpoint/2010/main" val="591301331"/>
       </p:ext>
     </p:extLst>
   </p:cSld>
@@ -5334,9 +5345,42 @@
           <a:lstStyle/>
           <a:p>
             <a:r>
-              <a:rPr lang="nl-NL" dirty="0" smtClean="0"/>
-              <a:t>Zie website</a:t>
-            </a:r>
+              <a:rPr lang="nl-NL" dirty="0" smtClean="0">
+                <a:hlinkClick r:id="rId2"/>
+              </a:rPr>
+              <a:t>Handleiding voor leerlingen</a:t>
+            </a:r>
+            <a:endParaRPr lang="nl-NL" dirty="0" smtClean="0"/>
+          </a:p>
+          <a:p>
+            <a:r>
+              <a:rPr lang="nl-NL" dirty="0" smtClean="0">
+                <a:hlinkClick r:id="rId3"/>
+              </a:rPr>
+              <a:t>Handleiding voor leerkrachten</a:t>
+            </a:r>
+            <a:r>
+              <a:rPr lang="nl-NL" dirty="0" smtClean="0"/>
+              <a:t> </a:t>
+            </a:r>
+            <a:r>
+              <a:rPr lang="nl-NL" dirty="0"/>
+              <a:t>: </a:t>
+            </a:r>
+            <a:r>
+              <a:rPr lang="nl-NL" dirty="0">
+                <a:hlinkClick r:id="rId3"/>
+              </a:rPr>
+              <a:t>https://dramco-iwast.github.io/handleiding-voor-leerkrachten/</a:t>
+            </a:r>
+            <a:endParaRPr lang="nl-NL" dirty="0">
+              <a:hlinkClick r:id="rId2"/>
+            </a:endParaRPr>
+          </a:p>
+          <a:p>
+            <a:pPr marL="0" indent="0">
+              <a:buNone/>
+            </a:pPr>
             <a:endParaRPr lang="nl-BE" dirty="0"/>
           </a:p>
         </p:txBody>
@@ -5403,8 +5447,8 @@
           <a:lstStyle/>
           <a:p>
             <a:r>
-              <a:rPr lang="nl-NL" dirty="0" err="1" smtClean="0"/>
-              <a:t>Subproblemen</a:t>
+              <a:rPr lang="nl-NL" dirty="0" smtClean="0"/>
+              <a:t>Materiaal voor leerkrachten en leerlingen</a:t>
             </a:r>
             <a:endParaRPr lang="nl-BE" dirty="0"/>
           </a:p>
@@ -5413,13 +5457,20 @@
     </p:spTree>
     <p:extLst>
       <p:ext uri="{BB962C8B-B14F-4D97-AF65-F5344CB8AC3E}">
-        <p14:creationId xmlns:p14="http://schemas.microsoft.com/office/powerpoint/2010/main" val="386746478"/>
+        <p14:creationId xmlns:p14="http://schemas.microsoft.com/office/powerpoint/2010/main" val="2204768146"/>
       </p:ext>
     </p:extLst>
   </p:cSld>
   <p:clrMapOvr>
     <a:masterClrMapping/>
   </p:clrMapOvr>
+  <p:timing>
+    <p:tnLst>
+      <p:par>
+        <p:cTn id="1" dur="indefinite" restart="never" nodeType="tmRoot"/>
+      </p:par>
+    </p:tnLst>
+  </p:timing>
 </p:sld>
 </file>
 
@@ -5452,83 +5503,12 @@
         </p:nvSpPr>
         <p:spPr/>
         <p:txBody>
-          <a:bodyPr>
-            <a:normAutofit lnSpcReduction="10000"/>
-          </a:bodyPr>
-          <a:lstStyle/>
-          <a:p>
-            <a:r>
-              <a:rPr lang="nl-NL" dirty="0" smtClean="0"/>
-              <a:t>Welkom en introductie project</a:t>
-            </a:r>
-          </a:p>
-          <a:p>
-            <a:r>
-              <a:rPr lang="nl-NL" dirty="0" smtClean="0"/>
-              <a:t>Overzicht project</a:t>
-            </a:r>
-          </a:p>
-          <a:p>
-            <a:pPr lvl="1"/>
-            <a:r>
-              <a:rPr lang="nl-NL" dirty="0" smtClean="0"/>
-              <a:t>Materiaal</a:t>
-            </a:r>
-            <a:endParaRPr lang="nl-NL" dirty="0" smtClean="0"/>
-          </a:p>
-          <a:p>
-            <a:pPr lvl="1"/>
-            <a:r>
-              <a:rPr lang="nl-NL" dirty="0" smtClean="0"/>
-              <a:t>Uitdaging</a:t>
-            </a:r>
-            <a:endParaRPr lang="nl-NL" dirty="0" smtClean="0"/>
-          </a:p>
-          <a:p>
-            <a:pPr lvl="1"/>
-            <a:r>
-              <a:rPr lang="nl-NL" dirty="0" err="1" smtClean="0"/>
-              <a:t>Subproblemen</a:t>
-            </a:r>
-            <a:endParaRPr lang="nl-NL" dirty="0" smtClean="0"/>
-          </a:p>
-          <a:p>
-            <a:r>
-              <a:rPr lang="nl-NL" b="1" dirty="0" smtClean="0"/>
-              <a:t>Internet </a:t>
-            </a:r>
-            <a:r>
-              <a:rPr lang="nl-NL" b="1" dirty="0" smtClean="0"/>
-              <a:t>der </a:t>
-            </a:r>
-            <a:r>
-              <a:rPr lang="nl-NL" b="1" dirty="0" smtClean="0"/>
-              <a:t>Dingen en sensoren</a:t>
-            </a:r>
-            <a:endParaRPr lang="nl-NL" b="1" dirty="0" smtClean="0"/>
-          </a:p>
-          <a:p>
-            <a:r>
-              <a:rPr lang="nl-NL" dirty="0" smtClean="0"/>
-              <a:t>Brainstorm</a:t>
-            </a:r>
-          </a:p>
-          <a:p>
-            <a:r>
-              <a:rPr lang="nl-NL" dirty="0" smtClean="0"/>
-              <a:t>Hands-on: configuratie sensoren</a:t>
-            </a:r>
-          </a:p>
-          <a:p>
-            <a:r>
-              <a:rPr lang="nl-NL" dirty="0" smtClean="0"/>
-              <a:t>Hands-on: data-analyse</a:t>
-            </a:r>
-          </a:p>
-          <a:p>
-            <a:r>
-              <a:rPr lang="nl-NL" dirty="0" smtClean="0"/>
-              <a:t>Reflectie en afsluit</a:t>
+          <a:bodyPr/>
+          <a:lstStyle/>
+          <a:p>
+            <a:r>
+              <a:rPr lang="nl-NL" dirty="0" smtClean="0"/>
+              <a:t>Zie website</a:t>
             </a:r>
             <a:endParaRPr lang="nl-BE" dirty="0"/>
           </a:p>
@@ -5597,7 +5577,7 @@
           <a:p>
             <a:r>
               <a:rPr lang="nl-NL" dirty="0" smtClean="0"/>
-              <a:t>Overzicht bijscholing</a:t>
+              <a:t>Uitdaging</a:t>
             </a:r>
             <a:endParaRPr lang="nl-BE" dirty="0"/>
           </a:p>
@@ -5606,13 +5586,20 @@
     </p:spTree>
     <p:extLst>
       <p:ext uri="{BB962C8B-B14F-4D97-AF65-F5344CB8AC3E}">
-        <p14:creationId xmlns:p14="http://schemas.microsoft.com/office/powerpoint/2010/main" val="2463207511"/>
+        <p14:creationId xmlns:p14="http://schemas.microsoft.com/office/powerpoint/2010/main" val="2157535991"/>
       </p:ext>
     </p:extLst>
   </p:cSld>
   <p:clrMapOvr>
     <a:masterClrMapping/>
   </p:clrMapOvr>
+  <p:timing>
+    <p:tnLst>
+      <p:par>
+        <p:cTn id="1" dur="indefinite" restart="never" nodeType="tmRoot"/>
+      </p:par>
+    </p:tnLst>
+  </p:timing>
 </p:sld>
 </file>
 
@@ -5650,39 +5637,7 @@
           <a:p>
             <a:r>
               <a:rPr lang="nl-NL" dirty="0" smtClean="0"/>
-              <a:t>Zie aparte </a:t>
-            </a:r>
-            <a:r>
-              <a:rPr lang="nl-NL" dirty="0" err="1" smtClean="0"/>
-              <a:t>ppt</a:t>
-            </a:r>
-            <a:endParaRPr lang="nl-BE" dirty="0"/>
-          </a:p>
-          <a:p>
-            <a:r>
-              <a:rPr lang="nl-NL" dirty="0" smtClean="0"/>
-              <a:t>Voor leerlingen: verschillende opties</a:t>
-            </a:r>
-          </a:p>
-          <a:p>
-            <a:pPr lvl="1"/>
-            <a:r>
-              <a:rPr lang="nl-NL" dirty="0" smtClean="0"/>
-              <a:t>Doceren</a:t>
-            </a:r>
-          </a:p>
-          <a:p>
-            <a:pPr lvl="1"/>
-            <a:r>
-              <a:rPr lang="nl-NL" dirty="0" smtClean="0"/>
-              <a:t>Zoekopdracht</a:t>
-            </a:r>
-          </a:p>
-          <a:p>
-            <a:pPr lvl="1"/>
-            <a:r>
-              <a:rPr lang="nl-NL" dirty="0" smtClean="0"/>
-              <a:t>…</a:t>
+              <a:t>Zie website</a:t>
             </a:r>
             <a:endParaRPr lang="nl-BE" dirty="0"/>
           </a:p>
@@ -5750,8 +5705,8 @@
           <a:lstStyle/>
           <a:p>
             <a:r>
-              <a:rPr lang="nl-NL" dirty="0" smtClean="0"/>
-              <a:t>Internet der Dingen</a:t>
+              <a:rPr lang="nl-NL" dirty="0" err="1" smtClean="0"/>
+              <a:t>Subproblemen</a:t>
             </a:r>
             <a:endParaRPr lang="nl-BE" dirty="0"/>
           </a:p>
@@ -5760,7 +5715,7 @@
     </p:spTree>
     <p:extLst>
       <p:ext uri="{BB962C8B-B14F-4D97-AF65-F5344CB8AC3E}">
-        <p14:creationId xmlns:p14="http://schemas.microsoft.com/office/powerpoint/2010/main" val="2201469389"/>
+        <p14:creationId xmlns:p14="http://schemas.microsoft.com/office/powerpoint/2010/main" val="386746478"/>
       </p:ext>
     </p:extLst>
   </p:cSld>
@@ -5799,48 +5754,73 @@
         </p:nvSpPr>
         <p:spPr/>
         <p:txBody>
-          <a:bodyPr/>
-          <a:lstStyle/>
-          <a:p>
-            <a:r>
-              <a:rPr lang="nl-NL" dirty="0" smtClean="0"/>
-              <a:t>Zie aparte </a:t>
-            </a:r>
+          <a:bodyPr>
+            <a:normAutofit lnSpcReduction="10000"/>
+          </a:bodyPr>
+          <a:lstStyle/>
+          <a:p>
+            <a:r>
+              <a:rPr lang="nl-NL" dirty="0" smtClean="0"/>
+              <a:t>Welkom en introductie project</a:t>
+            </a:r>
+          </a:p>
+          <a:p>
+            <a:r>
+              <a:rPr lang="nl-NL" dirty="0" smtClean="0"/>
+              <a:t>Overzicht project</a:t>
+            </a:r>
+          </a:p>
+          <a:p>
+            <a:pPr lvl="1"/>
+            <a:r>
+              <a:rPr lang="nl-NL" dirty="0" smtClean="0"/>
+              <a:t>Materiaal</a:t>
+            </a:r>
+          </a:p>
+          <a:p>
+            <a:pPr lvl="1"/>
+            <a:r>
+              <a:rPr lang="nl-NL" dirty="0" smtClean="0"/>
+              <a:t>Uitdaging</a:t>
+            </a:r>
+          </a:p>
+          <a:p>
+            <a:pPr lvl="1"/>
             <a:r>
               <a:rPr lang="nl-NL" dirty="0" err="1" smtClean="0"/>
-              <a:t>ppt</a:t>
+              <a:t>Subproblemen</a:t>
             </a:r>
             <a:endParaRPr lang="nl-NL" dirty="0" smtClean="0"/>
           </a:p>
           <a:p>
             <a:r>
-              <a:rPr lang="nl-NL" dirty="0"/>
-              <a:t>Voor leerlingen: verschillende opties</a:t>
-            </a:r>
-          </a:p>
-          <a:p>
-            <a:pPr lvl="1"/>
-            <a:r>
-              <a:rPr lang="nl-NL" dirty="0"/>
-              <a:t>Doceren</a:t>
-            </a:r>
-          </a:p>
-          <a:p>
-            <a:pPr lvl="1"/>
-            <a:r>
-              <a:rPr lang="nl-NL" dirty="0"/>
-              <a:t>Zoekopdracht</a:t>
-            </a:r>
-          </a:p>
-          <a:p>
-            <a:pPr lvl="1"/>
-            <a:r>
-              <a:rPr lang="nl-NL" dirty="0"/>
-              <a:t>…</a:t>
-            </a:r>
-            <a:endParaRPr lang="nl-BE" dirty="0"/>
-          </a:p>
-          <a:p>
+              <a:rPr lang="nl-NL" b="1" dirty="0" smtClean="0"/>
+              <a:t>Internet der Dingen en sensoren</a:t>
+            </a:r>
+          </a:p>
+          <a:p>
+            <a:r>
+              <a:rPr lang="nl-NL" dirty="0" smtClean="0"/>
+              <a:t>Brainstorm</a:t>
+            </a:r>
+          </a:p>
+          <a:p>
+            <a:r>
+              <a:rPr lang="nl-NL" dirty="0" smtClean="0"/>
+              <a:t>Hands-on: configuratie sensoren</a:t>
+            </a:r>
+          </a:p>
+          <a:p>
+            <a:r>
+              <a:rPr lang="nl-NL" dirty="0" smtClean="0"/>
+              <a:t>Hands-on: data-analyse</a:t>
+            </a:r>
+          </a:p>
+          <a:p>
+            <a:r>
+              <a:rPr lang="nl-NL" dirty="0" smtClean="0"/>
+              <a:t>Reflectie en afsluit</a:t>
+            </a:r>
             <a:endParaRPr lang="nl-BE" dirty="0"/>
           </a:p>
         </p:txBody>
@@ -5908,7 +5888,7 @@
           <a:p>
             <a:r>
               <a:rPr lang="nl-NL" dirty="0" smtClean="0"/>
-              <a:t>Sensoren</a:t>
+              <a:t>Overzicht bijscholing</a:t>
             </a:r>
             <a:endParaRPr lang="nl-BE" dirty="0"/>
           </a:p>
@@ -5917,7 +5897,7 @@
     </p:spTree>
     <p:extLst>
       <p:ext uri="{BB962C8B-B14F-4D97-AF65-F5344CB8AC3E}">
-        <p14:creationId xmlns:p14="http://schemas.microsoft.com/office/powerpoint/2010/main" val="4109717198"/>
+        <p14:creationId xmlns:p14="http://schemas.microsoft.com/office/powerpoint/2010/main" val="2463207511"/>
       </p:ext>
     </p:extLst>
   </p:cSld>
@@ -5956,83 +5936,44 @@
         </p:nvSpPr>
         <p:spPr/>
         <p:txBody>
-          <a:bodyPr>
-            <a:normAutofit lnSpcReduction="10000"/>
-          </a:bodyPr>
-          <a:lstStyle/>
-          <a:p>
-            <a:r>
-              <a:rPr lang="nl-NL" dirty="0" smtClean="0"/>
-              <a:t>Welkom en introductie project</a:t>
-            </a:r>
-          </a:p>
-          <a:p>
-            <a:r>
-              <a:rPr lang="nl-NL" dirty="0" smtClean="0"/>
-              <a:t>Overzicht project</a:t>
+          <a:bodyPr/>
+          <a:lstStyle/>
+          <a:p>
+            <a:r>
+              <a:rPr lang="nl-NL" dirty="0" smtClean="0"/>
+              <a:t>Zie aparte </a:t>
+            </a:r>
+            <a:r>
+              <a:rPr lang="nl-NL" dirty="0" err="1" smtClean="0"/>
+              <a:t>ppt</a:t>
+            </a:r>
+            <a:endParaRPr lang="nl-BE" dirty="0"/>
+          </a:p>
+          <a:p>
+            <a:r>
+              <a:rPr lang="nl-NL" dirty="0" smtClean="0"/>
+              <a:t>Voor leerlingen: verschillende opties</a:t>
             </a:r>
           </a:p>
           <a:p>
             <a:pPr lvl="1"/>
             <a:r>
               <a:rPr lang="nl-NL" dirty="0" smtClean="0"/>
-              <a:t>Materiaal</a:t>
-            </a:r>
-            <a:endParaRPr lang="nl-NL" dirty="0" smtClean="0"/>
+              <a:t>Doceren</a:t>
+            </a:r>
           </a:p>
           <a:p>
             <a:pPr lvl="1"/>
             <a:r>
               <a:rPr lang="nl-NL" dirty="0" smtClean="0"/>
-              <a:t>Uitdaging</a:t>
-            </a:r>
-            <a:endParaRPr lang="nl-NL" dirty="0" smtClean="0"/>
+              <a:t>Zoekopdracht</a:t>
+            </a:r>
           </a:p>
           <a:p>
             <a:pPr lvl="1"/>
             <a:r>
-              <a:rPr lang="nl-NL" dirty="0" err="1" smtClean="0"/>
-              <a:t>Subproblemen</a:t>
-            </a:r>
-            <a:endParaRPr lang="nl-NL" dirty="0" smtClean="0"/>
-          </a:p>
-          <a:p>
-            <a:r>
-              <a:rPr lang="nl-NL" dirty="0" smtClean="0"/>
-              <a:t>Internet </a:t>
-            </a:r>
-            <a:r>
-              <a:rPr lang="nl-NL" dirty="0" smtClean="0"/>
-              <a:t>der </a:t>
-            </a:r>
-            <a:r>
-              <a:rPr lang="nl-NL" dirty="0" smtClean="0"/>
-              <a:t>Dingen en sensoren</a:t>
-            </a:r>
-            <a:endParaRPr lang="nl-NL" dirty="0" smtClean="0"/>
-          </a:p>
-          <a:p>
-            <a:r>
-              <a:rPr lang="nl-NL" b="1" dirty="0" smtClean="0"/>
-              <a:t>Brainstorm</a:t>
-            </a:r>
-          </a:p>
-          <a:p>
-            <a:r>
-              <a:rPr lang="nl-NL" dirty="0" smtClean="0"/>
-              <a:t>Hands-on: configuratie sensoren</a:t>
-            </a:r>
-          </a:p>
-          <a:p>
-            <a:r>
-              <a:rPr lang="nl-NL" dirty="0" smtClean="0"/>
-              <a:t>Hands-on: data-analyse</a:t>
-            </a:r>
-          </a:p>
-          <a:p>
-            <a:r>
-              <a:rPr lang="nl-NL" dirty="0" smtClean="0"/>
-              <a:t>Reflectie en afsluit</a:t>
+              <a:rPr lang="nl-NL" dirty="0" smtClean="0"/>
+              <a:t>…</a:t>
             </a:r>
             <a:endParaRPr lang="nl-BE" dirty="0"/>
           </a:p>
@@ -6101,7 +6042,7 @@
           <a:p>
             <a:r>
               <a:rPr lang="nl-NL" dirty="0" smtClean="0"/>
-              <a:t>Overzicht bijscholing</a:t>
+              <a:t>Internet der Dingen</a:t>
             </a:r>
             <a:endParaRPr lang="nl-BE" dirty="0"/>
           </a:p>
@@ -6110,7 +6051,7 @@
     </p:spTree>
     <p:extLst>
       <p:ext uri="{BB962C8B-B14F-4D97-AF65-F5344CB8AC3E}">
-        <p14:creationId xmlns:p14="http://schemas.microsoft.com/office/powerpoint/2010/main" val="538598604"/>
+        <p14:creationId xmlns:p14="http://schemas.microsoft.com/office/powerpoint/2010/main" val="2201469389"/>
       </p:ext>
     </p:extLst>
   </p:cSld>
@@ -6154,8 +6095,43 @@
           <a:p>
             <a:r>
               <a:rPr lang="nl-NL" dirty="0" smtClean="0"/>
-              <a:t>Gegeven de randvoorwaarden: welke probleemstelling wil je graag onderzoeken?</a:t>
-            </a:r>
+              <a:t>Zie aparte </a:t>
+            </a:r>
+            <a:r>
+              <a:rPr lang="nl-NL" dirty="0" err="1" smtClean="0"/>
+              <a:t>ppt</a:t>
+            </a:r>
+            <a:endParaRPr lang="nl-NL" dirty="0" smtClean="0"/>
+          </a:p>
+          <a:p>
+            <a:r>
+              <a:rPr lang="nl-NL" dirty="0"/>
+              <a:t>Voor leerlingen: verschillende opties</a:t>
+            </a:r>
+          </a:p>
+          <a:p>
+            <a:pPr lvl="1"/>
+            <a:r>
+              <a:rPr lang="nl-NL" dirty="0"/>
+              <a:t>Doceren</a:t>
+            </a:r>
+          </a:p>
+          <a:p>
+            <a:pPr lvl="1"/>
+            <a:r>
+              <a:rPr lang="nl-NL" dirty="0"/>
+              <a:t>Zoekopdracht</a:t>
+            </a:r>
+          </a:p>
+          <a:p>
+            <a:pPr lvl="1"/>
+            <a:r>
+              <a:rPr lang="nl-NL" dirty="0"/>
+              <a:t>…</a:t>
+            </a:r>
+            <a:endParaRPr lang="nl-BE" dirty="0"/>
+          </a:p>
+          <a:p>
             <a:endParaRPr lang="nl-BE" dirty="0"/>
           </a:p>
         </p:txBody>
@@ -6223,7 +6199,7 @@
           <a:p>
             <a:r>
               <a:rPr lang="nl-NL" dirty="0" smtClean="0"/>
-              <a:t>Brainstorm</a:t>
+              <a:t>Sensoren</a:t>
             </a:r>
             <a:endParaRPr lang="nl-BE" dirty="0"/>
           </a:p>
@@ -6232,7 +6208,7 @@
     </p:spTree>
     <p:extLst>
       <p:ext uri="{BB962C8B-B14F-4D97-AF65-F5344CB8AC3E}">
-        <p14:creationId xmlns:p14="http://schemas.microsoft.com/office/powerpoint/2010/main" val="1185690991"/>
+        <p14:creationId xmlns:p14="http://schemas.microsoft.com/office/powerpoint/2010/main" val="4109717198"/>
       </p:ext>
     </p:extLst>
   </p:cSld>
@@ -6259,100 +6235,243 @@
           <a:chExt cx="0" cy="0"/>
         </a:xfrm>
       </p:grpSpPr>
-      <p:sp>
-        <p:nvSpPr>
-          <p:cNvPr id="2" name="Tijdelijke aanduiding voor inhoud 1"/>
-          <p:cNvSpPr>
-            <a:spLocks noGrp="1"/>
-          </p:cNvSpPr>
+      <p:graphicFrame>
+        <p:nvGraphicFramePr>
+          <p:cNvPr id="6" name="Tijdelijke aanduiding voor inhoud 5"/>
+          <p:cNvGraphicFramePr>
+            <a:graphicFrameLocks noGrp="1"/>
+          </p:cNvGraphicFramePr>
           <p:nvPr>
             <p:ph idx="1"/>
-          </p:nvPr>
-        </p:nvSpPr>
-        <p:spPr/>
-        <p:txBody>
-          <a:bodyPr>
-            <a:normAutofit lnSpcReduction="10000"/>
-          </a:bodyPr>
-          <a:lstStyle/>
-          <a:p>
-            <a:r>
-              <a:rPr lang="nl-NL" dirty="0" smtClean="0"/>
-              <a:t>Welkom en introductie project</a:t>
-            </a:r>
-          </a:p>
-          <a:p>
-            <a:r>
-              <a:rPr lang="nl-NL" dirty="0" smtClean="0"/>
-              <a:t>Overzicht project</a:t>
-            </a:r>
-          </a:p>
-          <a:p>
-            <a:pPr lvl="1"/>
-            <a:r>
-              <a:rPr lang="nl-NL" dirty="0" smtClean="0"/>
-              <a:t>Materiaal</a:t>
-            </a:r>
-            <a:endParaRPr lang="nl-NL" dirty="0" smtClean="0"/>
-          </a:p>
-          <a:p>
-            <a:pPr lvl="1"/>
-            <a:r>
-              <a:rPr lang="nl-NL" dirty="0" smtClean="0"/>
-              <a:t>Uitdaging</a:t>
-            </a:r>
-            <a:endParaRPr lang="nl-NL" dirty="0" smtClean="0"/>
-          </a:p>
-          <a:p>
-            <a:pPr lvl="1"/>
-            <a:r>
-              <a:rPr lang="nl-NL" dirty="0" err="1" smtClean="0"/>
-              <a:t>Subproblemen</a:t>
-            </a:r>
-            <a:endParaRPr lang="nl-NL" dirty="0" smtClean="0"/>
-          </a:p>
-          <a:p>
-            <a:r>
-              <a:rPr lang="nl-NL" dirty="0" smtClean="0"/>
-              <a:t>Internet </a:t>
-            </a:r>
-            <a:r>
-              <a:rPr lang="nl-NL" dirty="0" smtClean="0"/>
-              <a:t>der </a:t>
-            </a:r>
-            <a:r>
-              <a:rPr lang="nl-NL" dirty="0"/>
-              <a:t>Dingen en sensoren</a:t>
-            </a:r>
-            <a:endParaRPr lang="nl-NL" dirty="0" smtClean="0"/>
-          </a:p>
-          <a:p>
-            <a:r>
-              <a:rPr lang="nl-NL" dirty="0" smtClean="0"/>
-              <a:t>Brainstorm</a:t>
-            </a:r>
-          </a:p>
-          <a:p>
-            <a:r>
-              <a:rPr lang="nl-NL" b="1" dirty="0" smtClean="0"/>
-              <a:t>Hands-on: configuratie sensoren</a:t>
-            </a:r>
-          </a:p>
-          <a:p>
-            <a:r>
-              <a:rPr lang="nl-NL" dirty="0" smtClean="0"/>
-              <a:t>Hands-on: data-analyse</a:t>
-            </a:r>
-          </a:p>
-          <a:p>
-            <a:r>
-              <a:rPr lang="nl-NL" dirty="0" smtClean="0"/>
-              <a:t>Reflectie en afsluit</a:t>
-            </a:r>
-            <a:endParaRPr lang="nl-BE" dirty="0"/>
-          </a:p>
-        </p:txBody>
-      </p:sp>
+            <p:extLst>
+              <p:ext uri="{D42A27DB-BD31-4B8C-83A1-F6EECF244321}">
+                <p14:modId xmlns:p14="http://schemas.microsoft.com/office/powerpoint/2010/main" val="1031700064"/>
+              </p:ext>
+            </p:extLst>
+          </p:nvPr>
+        </p:nvGraphicFramePr>
+        <p:xfrm>
+          <a:off x="576263" y="1655763"/>
+          <a:ext cx="11041062" cy="1854200"/>
+        </p:xfrm>
+        <a:graphic>
+          <a:graphicData uri="http://schemas.openxmlformats.org/drawingml/2006/table">
+            <a:tbl>
+              <a:tblPr firstRow="1" bandRow="1">
+                <a:tableStyleId>{5C22544A-7EE6-4342-B048-85BDC9FD1C3A}</a:tableStyleId>
+              </a:tblPr>
+              <a:tblGrid>
+                <a:gridCol w="5520531">
+                  <a:extLst>
+                    <a:ext uri="{9D8B030D-6E8A-4147-A177-3AD203B41FA5}">
+                      <a16:colId xmlns:a16="http://schemas.microsoft.com/office/drawing/2014/main" val="3511284786"/>
+                    </a:ext>
+                  </a:extLst>
+                </a:gridCol>
+                <a:gridCol w="5520531">
+                  <a:extLst>
+                    <a:ext uri="{9D8B030D-6E8A-4147-A177-3AD203B41FA5}">
+                      <a16:colId xmlns:a16="http://schemas.microsoft.com/office/drawing/2014/main" val="1704407784"/>
+                    </a:ext>
+                  </a:extLst>
+                </a:gridCol>
+              </a:tblGrid>
+              <a:tr h="370840">
+                <a:tc>
+                  <a:txBody>
+                    <a:bodyPr/>
+                    <a:lstStyle/>
+                    <a:p>
+                      <a:r>
+                        <a:rPr lang="nl-NL" dirty="0" smtClean="0"/>
+                        <a:t>Moederborden</a:t>
+                      </a:r>
+                      <a:endParaRPr lang="nl-BE" dirty="0"/>
+                    </a:p>
+                  </a:txBody>
+                  <a:tcPr/>
+                </a:tc>
+                <a:tc>
+                  <a:txBody>
+                    <a:bodyPr/>
+                    <a:lstStyle/>
+                    <a:p>
+                      <a:r>
+                        <a:rPr lang="nl-NL" dirty="0" smtClean="0"/>
+                        <a:t>10</a:t>
+                      </a:r>
+                      <a:endParaRPr lang="nl-BE" dirty="0"/>
+                    </a:p>
+                  </a:txBody>
+                  <a:tcPr/>
+                </a:tc>
+                <a:extLst>
+                  <a:ext uri="{0D108BD9-81ED-4DB2-BD59-A6C34878D82A}">
+                    <a16:rowId xmlns:a16="http://schemas.microsoft.com/office/drawing/2014/main" val="718367595"/>
+                  </a:ext>
+                </a:extLst>
+              </a:tr>
+              <a:tr h="370840">
+                <a:tc>
+                  <a:txBody>
+                    <a:bodyPr/>
+                    <a:lstStyle/>
+                    <a:p>
+                      <a:r>
+                        <a:rPr lang="nl-NL" dirty="0" smtClean="0"/>
+                        <a:t>Omgevingssensor</a:t>
+                      </a:r>
+                      <a:endParaRPr lang="nl-BE" dirty="0"/>
+                    </a:p>
+                  </a:txBody>
+                  <a:tcPr/>
+                </a:tc>
+                <a:tc>
+                  <a:txBody>
+                    <a:bodyPr/>
+                    <a:lstStyle/>
+                    <a:p>
+                      <a:r>
+                        <a:rPr lang="nl-NL" dirty="0" smtClean="0"/>
+                        <a:t>5</a:t>
+                      </a:r>
+                      <a:endParaRPr lang="nl-BE" dirty="0"/>
+                    </a:p>
+                  </a:txBody>
+                  <a:tcPr/>
+                </a:tc>
+                <a:extLst>
+                  <a:ext uri="{0D108BD9-81ED-4DB2-BD59-A6C34878D82A}">
+                    <a16:rowId xmlns:a16="http://schemas.microsoft.com/office/drawing/2014/main" val="2056824321"/>
+                  </a:ext>
+                </a:extLst>
+              </a:tr>
+              <a:tr h="370840">
+                <a:tc>
+                  <a:txBody>
+                    <a:bodyPr/>
+                    <a:lstStyle/>
+                    <a:p>
+                      <a:r>
+                        <a:rPr lang="nl-NL" dirty="0" smtClean="0"/>
+                        <a:t>Geluidssensor</a:t>
+                      </a:r>
+                      <a:endParaRPr lang="nl-BE" dirty="0"/>
+                    </a:p>
+                  </a:txBody>
+                  <a:tcPr/>
+                </a:tc>
+                <a:tc>
+                  <a:txBody>
+                    <a:bodyPr/>
+                    <a:lstStyle/>
+                    <a:p>
+                      <a:r>
+                        <a:rPr lang="nl-NL" dirty="0" smtClean="0"/>
+                        <a:t>5</a:t>
+                      </a:r>
+                      <a:endParaRPr lang="nl-BE" dirty="0"/>
+                    </a:p>
+                  </a:txBody>
+                  <a:tcPr/>
+                </a:tc>
+                <a:extLst>
+                  <a:ext uri="{0D108BD9-81ED-4DB2-BD59-A6C34878D82A}">
+                    <a16:rowId xmlns:a16="http://schemas.microsoft.com/office/drawing/2014/main" val="962885668"/>
+                  </a:ext>
+                </a:extLst>
+              </a:tr>
+              <a:tr h="370840">
+                <a:tc>
+                  <a:txBody>
+                    <a:bodyPr/>
+                    <a:lstStyle/>
+                    <a:p>
+                      <a:r>
+                        <a:rPr lang="nl-NL" dirty="0" smtClean="0"/>
+                        <a:t>Drukknopsensor</a:t>
+                      </a:r>
+                      <a:endParaRPr lang="nl-BE" dirty="0"/>
+                    </a:p>
+                  </a:txBody>
+                  <a:tcPr/>
+                </a:tc>
+                <a:tc>
+                  <a:txBody>
+                    <a:bodyPr/>
+                    <a:lstStyle/>
+                    <a:p>
+                      <a:r>
+                        <a:rPr lang="nl-NL" dirty="0" smtClean="0"/>
+                        <a:t>5</a:t>
+                      </a:r>
+                      <a:endParaRPr lang="nl-BE" dirty="0"/>
+                    </a:p>
+                  </a:txBody>
+                  <a:tcPr/>
+                </a:tc>
+                <a:extLst>
+                  <a:ext uri="{0D108BD9-81ED-4DB2-BD59-A6C34878D82A}">
+                    <a16:rowId xmlns:a16="http://schemas.microsoft.com/office/drawing/2014/main" val="311352310"/>
+                  </a:ext>
+                </a:extLst>
+              </a:tr>
+              <a:tr h="370840">
+                <a:tc>
+                  <a:txBody>
+                    <a:bodyPr/>
+                    <a:lstStyle/>
+                    <a:p>
+                      <a:pPr marL="0" marR="0" indent="0" algn="l" defTabSz="914400" rtl="0" eaLnBrk="1" fontAlgn="auto" latinLnBrk="0" hangingPunct="1">
+                        <a:lnSpc>
+                          <a:spcPct val="100000"/>
+                        </a:lnSpc>
+                        <a:spcBef>
+                          <a:spcPts val="0"/>
+                        </a:spcBef>
+                        <a:spcAft>
+                          <a:spcPts val="0"/>
+                        </a:spcAft>
+                        <a:buClrTx/>
+                        <a:buSzTx/>
+                        <a:buFontTx/>
+                        <a:buNone/>
+                        <a:tabLst/>
+                        <a:defRPr/>
+                      </a:pPr>
+                      <a:r>
+                        <a:rPr lang="nl-NL" dirty="0" err="1" smtClean="0"/>
+                        <a:t>Vermogenmodule</a:t>
+                      </a:r>
+                      <a:endParaRPr lang="nl-BE" dirty="0" smtClean="0"/>
+                    </a:p>
+                  </a:txBody>
+                  <a:tcPr/>
+                </a:tc>
+                <a:tc>
+                  <a:txBody>
+                    <a:bodyPr/>
+                    <a:lstStyle/>
+                    <a:p>
+                      <a:r>
+                        <a:rPr lang="nl-NL" smtClean="0"/>
+                        <a:t>10</a:t>
+                      </a:r>
+                      <a:endParaRPr lang="nl-BE"/>
+                    </a:p>
+                  </a:txBody>
+                  <a:tcPr/>
+                </a:tc>
+                <a:extLst>
+                  <a:ext uri="{0D108BD9-81ED-4DB2-BD59-A6C34878D82A}">
+                    <a16:rowId xmlns:a16="http://schemas.microsoft.com/office/drawing/2014/main" val="3465759380"/>
+                  </a:ext>
+                </a:extLst>
+              </a:tr>
+            </a:tbl>
+          </a:graphicData>
+        </a:graphic>
+      </p:graphicFrame>
       <p:sp>
         <p:nvSpPr>
           <p:cNvPr id="3" name="Tijdelijke aanduiding voor voettekst 2"/>
@@ -6416,7 +6535,7 @@
           <a:p>
             <a:r>
               <a:rPr lang="nl-NL" dirty="0" smtClean="0"/>
-              <a:t>Overzicht bijscholing</a:t>
+              <a:t>Inhoud rugzak</a:t>
             </a:r>
             <a:endParaRPr lang="nl-BE" dirty="0"/>
           </a:p>
@@ -6425,7 +6544,7 @@
     </p:spTree>
     <p:extLst>
       <p:ext uri="{BB962C8B-B14F-4D97-AF65-F5344CB8AC3E}">
-        <p14:creationId xmlns:p14="http://schemas.microsoft.com/office/powerpoint/2010/main" val="385522305"/>
+        <p14:creationId xmlns:p14="http://schemas.microsoft.com/office/powerpoint/2010/main" val="3602161750"/>
       </p:ext>
     </p:extLst>
   </p:cSld>
@@ -6464,25 +6583,74 @@
         </p:nvSpPr>
         <p:spPr/>
         <p:txBody>
-          <a:bodyPr/>
-          <a:lstStyle/>
-          <a:p>
-            <a:r>
-              <a:rPr lang="nl-NL" dirty="0" smtClean="0"/>
-              <a:t>Welke sensoren</a:t>
-            </a:r>
-          </a:p>
-          <a:p>
-            <a:r>
-              <a:rPr lang="nl-NL" dirty="0" smtClean="0"/>
-              <a:t>Waar installeren</a:t>
-            </a:r>
-          </a:p>
-          <a:p>
-            <a:r>
-              <a:rPr lang="nl-NL" dirty="0" smtClean="0"/>
-              <a:t>Hoe configureren</a:t>
-            </a:r>
+          <a:bodyPr>
+            <a:normAutofit lnSpcReduction="10000"/>
+          </a:bodyPr>
+          <a:lstStyle/>
+          <a:p>
+            <a:r>
+              <a:rPr lang="nl-NL" dirty="0" smtClean="0"/>
+              <a:t>Welkom en introductie project</a:t>
+            </a:r>
+          </a:p>
+          <a:p>
+            <a:r>
+              <a:rPr lang="nl-NL" dirty="0" smtClean="0"/>
+              <a:t>Overzicht project</a:t>
+            </a:r>
+          </a:p>
+          <a:p>
+            <a:pPr lvl="1"/>
+            <a:r>
+              <a:rPr lang="nl-NL" dirty="0" smtClean="0"/>
+              <a:t>Materiaal</a:t>
+            </a:r>
+          </a:p>
+          <a:p>
+            <a:pPr lvl="1"/>
+            <a:r>
+              <a:rPr lang="nl-NL" dirty="0" smtClean="0"/>
+              <a:t>Uitdaging</a:t>
+            </a:r>
+          </a:p>
+          <a:p>
+            <a:pPr lvl="1"/>
+            <a:r>
+              <a:rPr lang="nl-NL" dirty="0" err="1" smtClean="0"/>
+              <a:t>Subproblemen</a:t>
+            </a:r>
+            <a:endParaRPr lang="nl-NL" dirty="0" smtClean="0"/>
+          </a:p>
+          <a:p>
+            <a:r>
+              <a:rPr lang="nl-NL" dirty="0" smtClean="0"/>
+              <a:t>Internet der Dingen en sensoren</a:t>
+            </a:r>
+          </a:p>
+          <a:p>
+            <a:r>
+              <a:rPr lang="nl-NL" b="1" dirty="0" smtClean="0"/>
+              <a:t>Brainstorm</a:t>
+            </a:r>
+          </a:p>
+          <a:p>
+            <a:r>
+              <a:rPr lang="nl-NL" dirty="0" smtClean="0"/>
+              <a:t>Hands-on: configuratie sensoren</a:t>
+            </a:r>
+          </a:p>
+          <a:p>
+            <a:r>
+              <a:rPr lang="nl-NL" dirty="0" smtClean="0"/>
+              <a:t>Hands-on: data-analyse</a:t>
+            </a:r>
+          </a:p>
+          <a:p>
+            <a:r>
+              <a:rPr lang="nl-NL" dirty="0" smtClean="0"/>
+              <a:t>Reflectie en afsluit</a:t>
+            </a:r>
+            <a:endParaRPr lang="nl-BE" dirty="0"/>
           </a:p>
         </p:txBody>
       </p:sp>
@@ -6549,7 +6717,7 @@
           <a:p>
             <a:r>
               <a:rPr lang="nl-NL" dirty="0" smtClean="0"/>
-              <a:t>Onderzoeksopzet</a:t>
+              <a:t>Overzicht bijscholing</a:t>
             </a:r>
             <a:endParaRPr lang="nl-BE" dirty="0"/>
           </a:p>
@@ -6558,7 +6726,7 @@
     </p:spTree>
     <p:extLst>
       <p:ext uri="{BB962C8B-B14F-4D97-AF65-F5344CB8AC3E}">
-        <p14:creationId xmlns:p14="http://schemas.microsoft.com/office/powerpoint/2010/main" val="2482216421"/>
+        <p14:creationId xmlns:p14="http://schemas.microsoft.com/office/powerpoint/2010/main" val="538598604"/>
       </p:ext>
     </p:extLst>
   </p:cSld>
@@ -6597,83 +6765,31 @@
         </p:nvSpPr>
         <p:spPr/>
         <p:txBody>
-          <a:bodyPr>
-            <a:normAutofit lnSpcReduction="10000"/>
-          </a:bodyPr>
-          <a:lstStyle/>
-          <a:p>
-            <a:r>
-              <a:rPr lang="nl-NL" dirty="0" smtClean="0"/>
-              <a:t>Welkom en introductie project</a:t>
-            </a:r>
-          </a:p>
-          <a:p>
-            <a:r>
-              <a:rPr lang="nl-NL" dirty="0" smtClean="0"/>
-              <a:t>Overzicht project</a:t>
-            </a:r>
-          </a:p>
-          <a:p>
-            <a:pPr lvl="1"/>
-            <a:r>
-              <a:rPr lang="nl-NL" dirty="0" smtClean="0"/>
-              <a:t>Materiaal</a:t>
+          <a:bodyPr/>
+          <a:lstStyle/>
+          <a:p>
+            <a:r>
+              <a:rPr lang="nl-NL" dirty="0">
+                <a:hlinkClick r:id="rId2"/>
+              </a:rPr>
+              <a:t>Concept </a:t>
+            </a:r>
+            <a:r>
+              <a:rPr lang="nl-NL" dirty="0" smtClean="0">
+                <a:hlinkClick r:id="rId2"/>
+              </a:rPr>
+              <a:t>map</a:t>
             </a:r>
             <a:endParaRPr lang="nl-NL" dirty="0" smtClean="0"/>
           </a:p>
           <a:p>
-            <a:pPr lvl="1"/>
-            <a:r>
-              <a:rPr lang="nl-NL" dirty="0" smtClean="0"/>
-              <a:t>Uitdaging</a:t>
-            </a:r>
-            <a:endParaRPr lang="nl-NL" dirty="0" smtClean="0"/>
-          </a:p>
-          <a:p>
-            <a:pPr lvl="1"/>
-            <a:r>
-              <a:rPr lang="nl-NL" dirty="0" err="1" smtClean="0"/>
-              <a:t>Subproblemen</a:t>
-            </a:r>
-            <a:endParaRPr lang="nl-NL" dirty="0" smtClean="0"/>
-          </a:p>
-          <a:p>
-            <a:r>
-              <a:rPr lang="nl-NL" dirty="0" smtClean="0"/>
-              <a:t>Internet </a:t>
-            </a:r>
-            <a:r>
-              <a:rPr lang="nl-NL" dirty="0" smtClean="0"/>
-              <a:t>der </a:t>
-            </a:r>
-            <a:r>
-              <a:rPr lang="nl-NL" dirty="0"/>
-              <a:t>Dingen en sensoren</a:t>
-            </a:r>
-            <a:endParaRPr lang="nl-NL" dirty="0" smtClean="0"/>
-          </a:p>
-          <a:p>
-            <a:r>
-              <a:rPr lang="nl-NL" dirty="0" smtClean="0"/>
-              <a:t>Brainstorm</a:t>
-            </a:r>
-          </a:p>
-          <a:p>
-            <a:r>
-              <a:rPr lang="nl-NL" dirty="0" smtClean="0"/>
-              <a:t>Hands-on: configuratie sensoren</a:t>
-            </a:r>
-          </a:p>
-          <a:p>
-            <a:r>
-              <a:rPr lang="nl-NL" b="1" dirty="0" smtClean="0"/>
-              <a:t>Hands-on: data-analyse</a:t>
-            </a:r>
-          </a:p>
-          <a:p>
-            <a:r>
-              <a:rPr lang="nl-NL" dirty="0" smtClean="0"/>
-              <a:t>Reflectie en afsluit</a:t>
+            <a:r>
+              <a:rPr lang="nl-NL" dirty="0" smtClean="0"/>
+              <a:t>Gegeven </a:t>
+            </a:r>
+            <a:r>
+              <a:rPr lang="nl-NL" dirty="0" smtClean="0"/>
+              <a:t>de randvoorwaarden: welke probleemstelling wil je graag onderzoeken?</a:t>
             </a:r>
             <a:endParaRPr lang="nl-BE" dirty="0"/>
           </a:p>
@@ -6742,7 +6858,7 @@
           <a:p>
             <a:r>
               <a:rPr lang="nl-NL" dirty="0" smtClean="0"/>
-              <a:t>Overzicht bijscholing</a:t>
+              <a:t>Brainstorm</a:t>
             </a:r>
             <a:endParaRPr lang="nl-BE" dirty="0"/>
           </a:p>
@@ -6751,7 +6867,7 @@
     </p:spTree>
     <p:extLst>
       <p:ext uri="{BB962C8B-B14F-4D97-AF65-F5344CB8AC3E}">
-        <p14:creationId xmlns:p14="http://schemas.microsoft.com/office/powerpoint/2010/main" val="3449488680"/>
+        <p14:creationId xmlns:p14="http://schemas.microsoft.com/office/powerpoint/2010/main" val="1185690991"/>
       </p:ext>
     </p:extLst>
   </p:cSld>
@@ -6984,10 +7100,79 @@
         </p:nvSpPr>
         <p:spPr/>
         <p:txBody>
-          <a:bodyPr/>
-          <a:lstStyle/>
-          <a:p>
-            <a:endParaRPr lang="nl-BE"/>
+          <a:bodyPr>
+            <a:normAutofit lnSpcReduction="10000"/>
+          </a:bodyPr>
+          <a:lstStyle/>
+          <a:p>
+            <a:r>
+              <a:rPr lang="nl-NL" dirty="0" smtClean="0"/>
+              <a:t>Welkom en introductie project</a:t>
+            </a:r>
+          </a:p>
+          <a:p>
+            <a:r>
+              <a:rPr lang="nl-NL" dirty="0" smtClean="0"/>
+              <a:t>Overzicht project</a:t>
+            </a:r>
+          </a:p>
+          <a:p>
+            <a:pPr lvl="1"/>
+            <a:r>
+              <a:rPr lang="nl-NL" dirty="0" smtClean="0"/>
+              <a:t>Materiaal</a:t>
+            </a:r>
+          </a:p>
+          <a:p>
+            <a:pPr lvl="1"/>
+            <a:r>
+              <a:rPr lang="nl-NL" dirty="0" smtClean="0"/>
+              <a:t>Uitdaging</a:t>
+            </a:r>
+          </a:p>
+          <a:p>
+            <a:pPr lvl="1"/>
+            <a:r>
+              <a:rPr lang="nl-NL" dirty="0" err="1" smtClean="0"/>
+              <a:t>Subproblemen</a:t>
+            </a:r>
+            <a:endParaRPr lang="nl-NL" dirty="0" smtClean="0"/>
+          </a:p>
+          <a:p>
+            <a:r>
+              <a:rPr lang="nl-NL" dirty="0" smtClean="0"/>
+              <a:t>Internet der </a:t>
+            </a:r>
+            <a:r>
+              <a:rPr lang="nl-NL" dirty="0"/>
+              <a:t>Dingen en sensoren</a:t>
+            </a:r>
+            <a:endParaRPr lang="nl-NL" dirty="0" smtClean="0"/>
+          </a:p>
+          <a:p>
+            <a:r>
+              <a:rPr lang="nl-NL" dirty="0" smtClean="0"/>
+              <a:t>Brainstorm</a:t>
+            </a:r>
+          </a:p>
+          <a:p>
+            <a:r>
+              <a:rPr lang="nl-NL" b="1" dirty="0" smtClean="0"/>
+              <a:t>Hands-on: configuratie sensoren</a:t>
+            </a:r>
+          </a:p>
+          <a:p>
+            <a:r>
+              <a:rPr lang="nl-NL" dirty="0" smtClean="0"/>
+              <a:t>Hands-on: data-analyse</a:t>
+            </a:r>
+          </a:p>
+          <a:p>
+            <a:r>
+              <a:rPr lang="nl-NL" dirty="0" smtClean="0"/>
+              <a:t>Reflectie en afsluit</a:t>
+            </a:r>
+            <a:endParaRPr lang="nl-BE" dirty="0"/>
           </a:p>
         </p:txBody>
       </p:sp>
@@ -7052,14 +7237,18 @@
           <a:bodyPr/>
           <a:lstStyle/>
           <a:p>
-            <a:endParaRPr lang="nl-BE"/>
+            <a:r>
+              <a:rPr lang="nl-NL" dirty="0" smtClean="0"/>
+              <a:t>Overzicht bijscholing</a:t>
+            </a:r>
+            <a:endParaRPr lang="nl-BE" dirty="0"/>
           </a:p>
         </p:txBody>
       </p:sp>
     </p:spTree>
     <p:extLst>
       <p:ext uri="{BB962C8B-B14F-4D97-AF65-F5344CB8AC3E}">
-        <p14:creationId xmlns:p14="http://schemas.microsoft.com/office/powerpoint/2010/main" val="3134578626"/>
+        <p14:creationId xmlns:p14="http://schemas.microsoft.com/office/powerpoint/2010/main" val="385522305"/>
       </p:ext>
     </p:extLst>
   </p:cSld>
@@ -7098,6 +7287,150 @@
         </p:nvSpPr>
         <p:spPr/>
         <p:txBody>
+          <a:bodyPr/>
+          <a:lstStyle/>
+          <a:p>
+            <a:r>
+              <a:rPr lang="nl-NL" dirty="0" smtClean="0"/>
+              <a:t>Welke sensoren</a:t>
+            </a:r>
+          </a:p>
+          <a:p>
+            <a:r>
+              <a:rPr lang="nl-NL" dirty="0" smtClean="0"/>
+              <a:t>Waar installeren</a:t>
+            </a:r>
+          </a:p>
+          <a:p>
+            <a:r>
+              <a:rPr lang="nl-NL" dirty="0" smtClean="0"/>
+              <a:t>Hoe </a:t>
+            </a:r>
+            <a:r>
+              <a:rPr lang="nl-NL" dirty="0" smtClean="0"/>
+              <a:t>configureren</a:t>
+            </a:r>
+          </a:p>
+          <a:p>
+            <a:r>
+              <a:rPr lang="nl-NL" dirty="0" smtClean="0"/>
+              <a:t>Installatie gateway: uitleg komt op handleiding voor leerkrachten</a:t>
+            </a:r>
+            <a:endParaRPr lang="nl-NL" dirty="0" smtClean="0"/>
+          </a:p>
+        </p:txBody>
+      </p:sp>
+      <p:sp>
+        <p:nvSpPr>
+          <p:cNvPr id="3" name="Tijdelijke aanduiding voor voettekst 2"/>
+          <p:cNvSpPr>
+            <a:spLocks noGrp="1"/>
+          </p:cNvSpPr>
+          <p:nvPr>
+            <p:ph type="ftr" sz="quarter" idx="11"/>
+          </p:nvPr>
+        </p:nvSpPr>
+        <p:spPr/>
+        <p:txBody>
+          <a:bodyPr/>
+          <a:lstStyle/>
+          <a:p>
+            <a:r>
+              <a:rPr lang="nl-BE" smtClean="0"/>
+              <a:t>Technologiecampus Gent, faculteit Industriële Ingenieurswetenschappen</a:t>
+            </a:r>
+            <a:endParaRPr lang="nl-NL"/>
+          </a:p>
+        </p:txBody>
+      </p:sp>
+      <p:sp>
+        <p:nvSpPr>
+          <p:cNvPr id="4" name="Tijdelijke aanduiding voor dianummer 3"/>
+          <p:cNvSpPr>
+            <a:spLocks noGrp="1"/>
+          </p:cNvSpPr>
+          <p:nvPr>
+            <p:ph type="sldNum" sz="quarter" idx="12"/>
+          </p:nvPr>
+        </p:nvSpPr>
+        <p:spPr/>
+        <p:txBody>
+          <a:bodyPr/>
+          <a:lstStyle/>
+          <a:p>
+            <a:fld id="{0A297500-7527-634B-90F4-69D0994C32B4}" type="slidenum">
+              <a:rPr lang="nl-NL" smtClean="0"/>
+              <a:t>21</a:t>
+            </a:fld>
+            <a:endParaRPr lang="nl-NL"/>
+          </a:p>
+        </p:txBody>
+      </p:sp>
+      <p:sp>
+        <p:nvSpPr>
+          <p:cNvPr id="5" name="Titel 4"/>
+          <p:cNvSpPr>
+            <a:spLocks noGrp="1"/>
+          </p:cNvSpPr>
+          <p:nvPr>
+            <p:ph type="title"/>
+          </p:nvPr>
+        </p:nvSpPr>
+        <p:spPr/>
+        <p:txBody>
+          <a:bodyPr/>
+          <a:lstStyle/>
+          <a:p>
+            <a:r>
+              <a:rPr lang="nl-NL" dirty="0" smtClean="0"/>
+              <a:t>Onderzoeksopzet</a:t>
+            </a:r>
+            <a:endParaRPr lang="nl-BE" dirty="0"/>
+          </a:p>
+        </p:txBody>
+      </p:sp>
+    </p:spTree>
+    <p:extLst>
+      <p:ext uri="{BB962C8B-B14F-4D97-AF65-F5344CB8AC3E}">
+        <p14:creationId xmlns:p14="http://schemas.microsoft.com/office/powerpoint/2010/main" val="2482216421"/>
+      </p:ext>
+    </p:extLst>
+  </p:cSld>
+  <p:clrMapOvr>
+    <a:masterClrMapping/>
+  </p:clrMapOvr>
+</p:sld>
+</file>
+
+<file path=ppt/slides/slide22.xml><?xml version="1.0" encoding="utf-8"?>
+<p:sld xmlns:a="http://schemas.openxmlformats.org/drawingml/2006/main" xmlns:r="http://schemas.openxmlformats.org/officeDocument/2006/relationships" xmlns:p="http://schemas.openxmlformats.org/presentationml/2006/main">
+  <p:cSld>
+    <p:spTree>
+      <p:nvGrpSpPr>
+        <p:cNvPr id="1" name=""/>
+        <p:cNvGrpSpPr/>
+        <p:nvPr/>
+      </p:nvGrpSpPr>
+      <p:grpSpPr>
+        <a:xfrm>
+          <a:off x="0" y="0"/>
+          <a:ext cx="0" cy="0"/>
+          <a:chOff x="0" y="0"/>
+          <a:chExt cx="0" cy="0"/>
+        </a:xfrm>
+      </p:grpSpPr>
+      <p:sp>
+        <p:nvSpPr>
+          <p:cNvPr id="2" name="Tijdelijke aanduiding voor inhoud 1"/>
+          <p:cNvSpPr>
+            <a:spLocks noGrp="1"/>
+          </p:cNvSpPr>
+          <p:nvPr>
+            <p:ph idx="1"/>
+          </p:nvPr>
+        </p:nvSpPr>
+        <p:spPr/>
+        <p:txBody>
           <a:bodyPr>
             <a:normAutofit lnSpcReduction="10000"/>
           </a:bodyPr>
@@ -7120,7 +7453,6 @@
               <a:rPr lang="nl-NL" dirty="0" smtClean="0"/>
               <a:t>Materiaal</a:t>
             </a:r>
-            <a:endParaRPr lang="nl-NL" dirty="0" smtClean="0"/>
           </a:p>
           <a:p>
             <a:pPr lvl="1"/>
@@ -7128,7 +7460,6 @@
               <a:rPr lang="nl-NL" dirty="0" smtClean="0"/>
               <a:t>Uitdaging</a:t>
             </a:r>
-            <a:endParaRPr lang="nl-NL" dirty="0" smtClean="0"/>
           </a:p>
           <a:p>
             <a:pPr lvl="1"/>
@@ -7141,11 +7472,7 @@
           <a:p>
             <a:r>
               <a:rPr lang="nl-NL" dirty="0" smtClean="0"/>
-              <a:t>Internet </a:t>
-            </a:r>
-            <a:r>
-              <a:rPr lang="nl-NL" dirty="0" smtClean="0"/>
-              <a:t>der </a:t>
+              <a:t>Internet der </a:t>
             </a:r>
             <a:r>
               <a:rPr lang="nl-NL" dirty="0"/>
@@ -7167,6 +7494,307 @@
           </a:p>
           <a:p>
             <a:r>
+              <a:rPr lang="nl-NL" b="1" dirty="0" smtClean="0"/>
+              <a:t>Hands-on: data-analyse</a:t>
+            </a:r>
+          </a:p>
+          <a:p>
+            <a:r>
+              <a:rPr lang="nl-NL" dirty="0" smtClean="0"/>
+              <a:t>Reflectie en afsluit</a:t>
+            </a:r>
+            <a:endParaRPr lang="nl-BE" dirty="0"/>
+          </a:p>
+        </p:txBody>
+      </p:sp>
+      <p:sp>
+        <p:nvSpPr>
+          <p:cNvPr id="3" name="Tijdelijke aanduiding voor voettekst 2"/>
+          <p:cNvSpPr>
+            <a:spLocks noGrp="1"/>
+          </p:cNvSpPr>
+          <p:nvPr>
+            <p:ph type="ftr" sz="quarter" idx="11"/>
+          </p:nvPr>
+        </p:nvSpPr>
+        <p:spPr/>
+        <p:txBody>
+          <a:bodyPr/>
+          <a:lstStyle/>
+          <a:p>
+            <a:r>
+              <a:rPr lang="nl-BE" smtClean="0"/>
+              <a:t>Technologiecampus Gent, faculteit Industriële Ingenieurswetenschappen</a:t>
+            </a:r>
+            <a:endParaRPr lang="nl-NL"/>
+          </a:p>
+        </p:txBody>
+      </p:sp>
+      <p:sp>
+        <p:nvSpPr>
+          <p:cNvPr id="4" name="Tijdelijke aanduiding voor dianummer 3"/>
+          <p:cNvSpPr>
+            <a:spLocks noGrp="1"/>
+          </p:cNvSpPr>
+          <p:nvPr>
+            <p:ph type="sldNum" sz="quarter" idx="12"/>
+          </p:nvPr>
+        </p:nvSpPr>
+        <p:spPr/>
+        <p:txBody>
+          <a:bodyPr/>
+          <a:lstStyle/>
+          <a:p>
+            <a:fld id="{0A297500-7527-634B-90F4-69D0994C32B4}" type="slidenum">
+              <a:rPr lang="nl-NL" smtClean="0"/>
+              <a:t>22</a:t>
+            </a:fld>
+            <a:endParaRPr lang="nl-NL"/>
+          </a:p>
+        </p:txBody>
+      </p:sp>
+      <p:sp>
+        <p:nvSpPr>
+          <p:cNvPr id="5" name="Titel 4"/>
+          <p:cNvSpPr>
+            <a:spLocks noGrp="1"/>
+          </p:cNvSpPr>
+          <p:nvPr>
+            <p:ph type="title"/>
+          </p:nvPr>
+        </p:nvSpPr>
+        <p:spPr/>
+        <p:txBody>
+          <a:bodyPr/>
+          <a:lstStyle/>
+          <a:p>
+            <a:r>
+              <a:rPr lang="nl-NL" dirty="0" smtClean="0"/>
+              <a:t>Overzicht bijscholing</a:t>
+            </a:r>
+            <a:endParaRPr lang="nl-BE" dirty="0"/>
+          </a:p>
+        </p:txBody>
+      </p:sp>
+    </p:spTree>
+    <p:extLst>
+      <p:ext uri="{BB962C8B-B14F-4D97-AF65-F5344CB8AC3E}">
+        <p14:creationId xmlns:p14="http://schemas.microsoft.com/office/powerpoint/2010/main" val="3449488680"/>
+      </p:ext>
+    </p:extLst>
+  </p:cSld>
+  <p:clrMapOvr>
+    <a:masterClrMapping/>
+  </p:clrMapOvr>
+</p:sld>
+</file>
+
+<file path=ppt/slides/slide23.xml><?xml version="1.0" encoding="utf-8"?>
+<p:sld xmlns:a="http://schemas.openxmlformats.org/drawingml/2006/main" xmlns:r="http://schemas.openxmlformats.org/officeDocument/2006/relationships" xmlns:p="http://schemas.openxmlformats.org/presentationml/2006/main">
+  <p:cSld>
+    <p:spTree>
+      <p:nvGrpSpPr>
+        <p:cNvPr id="1" name=""/>
+        <p:cNvGrpSpPr/>
+        <p:nvPr/>
+      </p:nvGrpSpPr>
+      <p:grpSpPr>
+        <a:xfrm>
+          <a:off x="0" y="0"/>
+          <a:ext cx="0" cy="0"/>
+          <a:chOff x="0" y="0"/>
+          <a:chExt cx="0" cy="0"/>
+        </a:xfrm>
+      </p:grpSpPr>
+      <p:sp>
+        <p:nvSpPr>
+          <p:cNvPr id="2" name="Tijdelijke aanduiding voor inhoud 1"/>
+          <p:cNvSpPr>
+            <a:spLocks noGrp="1"/>
+          </p:cNvSpPr>
+          <p:nvPr>
+            <p:ph idx="1"/>
+          </p:nvPr>
+        </p:nvSpPr>
+        <p:spPr/>
+        <p:txBody>
+          <a:bodyPr/>
+          <a:lstStyle/>
+          <a:p>
+            <a:endParaRPr lang="nl-BE"/>
+          </a:p>
+        </p:txBody>
+      </p:sp>
+      <p:sp>
+        <p:nvSpPr>
+          <p:cNvPr id="3" name="Tijdelijke aanduiding voor voettekst 2"/>
+          <p:cNvSpPr>
+            <a:spLocks noGrp="1"/>
+          </p:cNvSpPr>
+          <p:nvPr>
+            <p:ph type="ftr" sz="quarter" idx="11"/>
+          </p:nvPr>
+        </p:nvSpPr>
+        <p:spPr/>
+        <p:txBody>
+          <a:bodyPr/>
+          <a:lstStyle/>
+          <a:p>
+            <a:r>
+              <a:rPr lang="nl-BE" smtClean="0"/>
+              <a:t>Technologiecampus Gent, faculteit Industriële Ingenieurswetenschappen</a:t>
+            </a:r>
+            <a:endParaRPr lang="nl-NL"/>
+          </a:p>
+        </p:txBody>
+      </p:sp>
+      <p:sp>
+        <p:nvSpPr>
+          <p:cNvPr id="4" name="Tijdelijke aanduiding voor dianummer 3"/>
+          <p:cNvSpPr>
+            <a:spLocks noGrp="1"/>
+          </p:cNvSpPr>
+          <p:nvPr>
+            <p:ph type="sldNum" sz="quarter" idx="12"/>
+          </p:nvPr>
+        </p:nvSpPr>
+        <p:spPr/>
+        <p:txBody>
+          <a:bodyPr/>
+          <a:lstStyle/>
+          <a:p>
+            <a:fld id="{0A297500-7527-634B-90F4-69D0994C32B4}" type="slidenum">
+              <a:rPr lang="nl-NL" smtClean="0"/>
+              <a:t>23</a:t>
+            </a:fld>
+            <a:endParaRPr lang="nl-NL"/>
+          </a:p>
+        </p:txBody>
+      </p:sp>
+      <p:sp>
+        <p:nvSpPr>
+          <p:cNvPr id="5" name="Titel 4"/>
+          <p:cNvSpPr>
+            <a:spLocks noGrp="1"/>
+          </p:cNvSpPr>
+          <p:nvPr>
+            <p:ph type="title"/>
+          </p:nvPr>
+        </p:nvSpPr>
+        <p:spPr/>
+        <p:txBody>
+          <a:bodyPr/>
+          <a:lstStyle/>
+          <a:p>
+            <a:endParaRPr lang="nl-BE"/>
+          </a:p>
+        </p:txBody>
+      </p:sp>
+    </p:spTree>
+    <p:extLst>
+      <p:ext uri="{BB962C8B-B14F-4D97-AF65-F5344CB8AC3E}">
+        <p14:creationId xmlns:p14="http://schemas.microsoft.com/office/powerpoint/2010/main" val="3134578626"/>
+      </p:ext>
+    </p:extLst>
+  </p:cSld>
+  <p:clrMapOvr>
+    <a:masterClrMapping/>
+  </p:clrMapOvr>
+</p:sld>
+</file>
+
+<file path=ppt/slides/slide24.xml><?xml version="1.0" encoding="utf-8"?>
+<p:sld xmlns:a="http://schemas.openxmlformats.org/drawingml/2006/main" xmlns:r="http://schemas.openxmlformats.org/officeDocument/2006/relationships" xmlns:p="http://schemas.openxmlformats.org/presentationml/2006/main">
+  <p:cSld>
+    <p:spTree>
+      <p:nvGrpSpPr>
+        <p:cNvPr id="1" name=""/>
+        <p:cNvGrpSpPr/>
+        <p:nvPr/>
+      </p:nvGrpSpPr>
+      <p:grpSpPr>
+        <a:xfrm>
+          <a:off x="0" y="0"/>
+          <a:ext cx="0" cy="0"/>
+          <a:chOff x="0" y="0"/>
+          <a:chExt cx="0" cy="0"/>
+        </a:xfrm>
+      </p:grpSpPr>
+      <p:sp>
+        <p:nvSpPr>
+          <p:cNvPr id="2" name="Tijdelijke aanduiding voor inhoud 1"/>
+          <p:cNvSpPr>
+            <a:spLocks noGrp="1"/>
+          </p:cNvSpPr>
+          <p:nvPr>
+            <p:ph idx="1"/>
+          </p:nvPr>
+        </p:nvSpPr>
+        <p:spPr/>
+        <p:txBody>
+          <a:bodyPr>
+            <a:normAutofit lnSpcReduction="10000"/>
+          </a:bodyPr>
+          <a:lstStyle/>
+          <a:p>
+            <a:r>
+              <a:rPr lang="nl-NL" dirty="0" smtClean="0"/>
+              <a:t>Welkom en introductie project</a:t>
+            </a:r>
+          </a:p>
+          <a:p>
+            <a:r>
+              <a:rPr lang="nl-NL" dirty="0" smtClean="0"/>
+              <a:t>Overzicht project</a:t>
+            </a:r>
+          </a:p>
+          <a:p>
+            <a:pPr lvl="1"/>
+            <a:r>
+              <a:rPr lang="nl-NL" dirty="0" smtClean="0"/>
+              <a:t>Materiaal</a:t>
+            </a:r>
+          </a:p>
+          <a:p>
+            <a:pPr lvl="1"/>
+            <a:r>
+              <a:rPr lang="nl-NL" dirty="0" smtClean="0"/>
+              <a:t>Uitdaging</a:t>
+            </a:r>
+          </a:p>
+          <a:p>
+            <a:pPr lvl="1"/>
+            <a:r>
+              <a:rPr lang="nl-NL" dirty="0" err="1" smtClean="0"/>
+              <a:t>Subproblemen</a:t>
+            </a:r>
+            <a:endParaRPr lang="nl-NL" dirty="0" smtClean="0"/>
+          </a:p>
+          <a:p>
+            <a:r>
+              <a:rPr lang="nl-NL" dirty="0" smtClean="0"/>
+              <a:t>Internet der </a:t>
+            </a:r>
+            <a:r>
+              <a:rPr lang="nl-NL" dirty="0"/>
+              <a:t>Dingen en sensoren</a:t>
+            </a:r>
+            <a:endParaRPr lang="nl-NL" dirty="0" smtClean="0"/>
+          </a:p>
+          <a:p>
+            <a:r>
+              <a:rPr lang="nl-NL" dirty="0" smtClean="0"/>
+              <a:t>Brainstorm</a:t>
+            </a:r>
+          </a:p>
+          <a:p>
+            <a:r>
+              <a:rPr lang="nl-NL" dirty="0" smtClean="0"/>
+              <a:t>Hands-on: configuratie sensoren</a:t>
+            </a:r>
+          </a:p>
+          <a:p>
+            <a:r>
               <a:rPr lang="nl-NL" dirty="0" smtClean="0"/>
               <a:t>Hands-on: data-analyse</a:t>
             </a:r>
@@ -7220,7 +7848,7 @@
           <a:p>
             <a:fld id="{0A297500-7527-634B-90F4-69D0994C32B4}" type="slidenum">
               <a:rPr lang="nl-NL" smtClean="0"/>
-              <a:t>21</a:t>
+              <a:t>24</a:t>
             </a:fld>
             <a:endParaRPr lang="nl-NL"/>
           </a:p>
@@ -7789,6 +8417,13 @@
   <p:clrMapOvr>
     <a:masterClrMapping/>
   </p:clrMapOvr>
+  <p:timing>
+    <p:tnLst>
+      <p:par>
+        <p:cTn id="1" dur="indefinite" restart="never" nodeType="tmRoot"/>
+      </p:par>
+    </p:tnLst>
+  </p:timing>
 </p:sld>
 </file>
 
@@ -7883,17 +8518,12 @@
           </a:p>
           <a:p>
             <a:r>
-              <a:rPr lang="nl-NL" dirty="0" smtClean="0">
-                <a:hlinkClick r:id="rId2"/>
-              </a:rPr>
-              <a:t>Concept map</a:t>
-            </a:r>
-            <a:endParaRPr lang="nl-NL" dirty="0" smtClean="0"/>
-          </a:p>
-          <a:p>
-            <a:r>
-              <a:rPr lang="nl-NL" dirty="0" smtClean="0"/>
-              <a:t>Kern-project met mogelijkheid dieper in te gaan op </a:t>
+              <a:rPr lang="nl-NL" dirty="0" smtClean="0"/>
+              <a:t>Kern-project </a:t>
+            </a:r>
+            <a:r>
+              <a:rPr lang="nl-NL" dirty="0" smtClean="0"/>
+              <a:t>met mogelijkheid dieper in te gaan op </a:t>
             </a:r>
           </a:p>
           <a:p>
@@ -8026,6 +8656,13 @@
   <p:clrMapOvr>
     <a:masterClrMapping/>
   </p:clrMapOvr>
+  <p:timing>
+    <p:tnLst>
+      <p:par>
+        <p:cTn id="1" dur="indefinite" restart="never" nodeType="tmRoot"/>
+      </p:par>
+    </p:tnLst>
+  </p:timing>
 </p:sld>
 </file>
 
@@ -8483,7 +9120,6 @@
               <a:rPr lang="nl-NL" dirty="0" smtClean="0"/>
               <a:t>Materiaal</a:t>
             </a:r>
-            <a:endParaRPr lang="nl-NL" dirty="0" smtClean="0"/>
           </a:p>
           <a:p>
             <a:pPr lvl="1"/>
@@ -8491,7 +9127,6 @@
               <a:rPr lang="nl-NL" dirty="0" smtClean="0"/>
               <a:t>Uitdaging</a:t>
             </a:r>
-            <a:endParaRPr lang="nl-NL" dirty="0" smtClean="0"/>
           </a:p>
           <a:p>
             <a:pPr lvl="1"/>
@@ -8504,11 +9139,7 @@
           <a:p>
             <a:r>
               <a:rPr lang="nl-NL" dirty="0" smtClean="0"/>
-              <a:t>Internet </a:t>
-            </a:r>
-            <a:r>
-              <a:rPr lang="nl-NL" dirty="0" smtClean="0"/>
-              <a:t>der </a:t>
+              <a:t>Internet der </a:t>
             </a:r>
             <a:r>
               <a:rPr lang="nl-NL" dirty="0"/>
@@ -8644,62 +9275,6 @@
       </p:grpSpPr>
       <p:sp>
         <p:nvSpPr>
-          <p:cNvPr id="2" name="Tijdelijke aanduiding voor inhoud 1"/>
-          <p:cNvSpPr>
-            <a:spLocks noGrp="1"/>
-          </p:cNvSpPr>
-          <p:nvPr>
-            <p:ph idx="1"/>
-          </p:nvPr>
-        </p:nvSpPr>
-        <p:spPr/>
-        <p:txBody>
-          <a:bodyPr/>
-          <a:lstStyle/>
-          <a:p>
-            <a:r>
-              <a:rPr lang="nl-NL" dirty="0" smtClean="0">
-                <a:hlinkClick r:id="rId2"/>
-              </a:rPr>
-              <a:t>Handleiding voor leerlingen</a:t>
-            </a:r>
-            <a:endParaRPr lang="nl-NL" dirty="0" smtClean="0"/>
-          </a:p>
-          <a:p>
-            <a:r>
-              <a:rPr lang="nl-NL" dirty="0" smtClean="0">
-                <a:hlinkClick r:id="rId3"/>
-              </a:rPr>
-              <a:t>Handleiding voor leerkrachten</a:t>
-            </a:r>
-            <a:r>
-              <a:rPr lang="nl-NL" dirty="0" smtClean="0"/>
-              <a:t> </a:t>
-            </a:r>
-            <a:r>
-              <a:rPr lang="nl-NL" dirty="0"/>
-              <a:t>: </a:t>
-            </a:r>
-            <a:r>
-              <a:rPr lang="nl-NL" dirty="0">
-                <a:hlinkClick r:id="rId3"/>
-              </a:rPr>
-              <a:t>https://dramco-iwast.github.io/handleiding-voor-leerkrachten/</a:t>
-            </a:r>
-            <a:endParaRPr lang="nl-NL" dirty="0">
-              <a:hlinkClick r:id="rId2"/>
-            </a:endParaRPr>
-          </a:p>
-          <a:p>
-            <a:pPr marL="0" indent="0">
-              <a:buNone/>
-            </a:pPr>
-            <a:endParaRPr lang="nl-BE" dirty="0"/>
-          </a:p>
-        </p:txBody>
-      </p:sp>
-      <p:sp>
-        <p:nvSpPr>
           <p:cNvPr id="3" name="Tijdelijke aanduiding voor voettekst 2"/>
           <p:cNvSpPr>
             <a:spLocks noGrp="1"/>
@@ -8760,23 +9335,82 @@
           <a:lstStyle/>
           <a:p>
             <a:r>
-              <a:rPr lang="nl-NL" dirty="0" smtClean="0"/>
-              <a:t>Materiaal voor leerkrachten en leerlingen</a:t>
+              <a:rPr lang="nl-NL" dirty="0" err="1" smtClean="0"/>
+              <a:t>IoT</a:t>
+            </a:r>
+            <a:r>
+              <a:rPr lang="nl-NL" dirty="0" smtClean="0"/>
+              <a:t>?</a:t>
             </a:r>
             <a:endParaRPr lang="nl-BE" dirty="0"/>
           </a:p>
         </p:txBody>
       </p:sp>
+      <p:pic>
+        <p:nvPicPr>
+          <p:cNvPr id="7" name="Afbeelding 6"/>
+          <p:cNvPicPr>
+            <a:picLocks noChangeAspect="1"/>
+          </p:cNvPicPr>
+          <p:nvPr/>
+        </p:nvPicPr>
+        <p:blipFill>
+          <a:blip r:embed="rId2"/>
+          <a:stretch>
+            <a:fillRect/>
+          </a:stretch>
+        </p:blipFill>
+        <p:spPr>
+          <a:xfrm>
+            <a:off x="122058" y="1113301"/>
+            <a:ext cx="6406250" cy="3886295"/>
+          </a:xfrm>
+          <a:prstGeom prst="rect">
+            <a:avLst/>
+          </a:prstGeom>
+        </p:spPr>
+      </p:pic>
+      <p:pic>
+        <p:nvPicPr>
+          <p:cNvPr id="9" name="Afbeelding 8"/>
+          <p:cNvPicPr>
+            <a:picLocks noChangeAspect="1"/>
+          </p:cNvPicPr>
+          <p:nvPr/>
+        </p:nvPicPr>
+        <p:blipFill>
+          <a:blip r:embed="rId3"/>
+          <a:stretch>
+            <a:fillRect/>
+          </a:stretch>
+        </p:blipFill>
+        <p:spPr>
+          <a:xfrm>
+            <a:off x="6528308" y="3502319"/>
+            <a:ext cx="5663692" cy="2702800"/>
+          </a:xfrm>
+          <a:prstGeom prst="rect">
+            <a:avLst/>
+          </a:prstGeom>
+        </p:spPr>
+      </p:pic>
     </p:spTree>
     <p:extLst>
       <p:ext uri="{BB962C8B-B14F-4D97-AF65-F5344CB8AC3E}">
-        <p14:creationId xmlns:p14="http://schemas.microsoft.com/office/powerpoint/2010/main" val="2204768146"/>
+        <p14:creationId xmlns:p14="http://schemas.microsoft.com/office/powerpoint/2010/main" val="2647096395"/>
       </p:ext>
     </p:extLst>
   </p:cSld>
   <p:clrMapOvr>
     <a:masterClrMapping/>
   </p:clrMapOvr>
+  <p:timing>
+    <p:tnLst>
+      <p:par>
+        <p:cTn id="1" dur="indefinite" restart="never" nodeType="tmRoot"/>
+      </p:par>
+    </p:tnLst>
+  </p:timing>
 </p:sld>
 </file>
 

</xml_diff>

<commit_message>
changed iwast adress + ppt bijscholing
</commit_message>
<xml_diff>
--- a/assets/files/IWAST-bijscholingsmoment.pptx
+++ b/assets/files/IWAST-bijscholingsmoment.pptx
@@ -6,10 +6,10 @@
     <p:sldMasterId id="2147483694" r:id="rId2"/>
   </p:sldMasterIdLst>
   <p:notesMasterIdLst>
-    <p:notesMasterId r:id="rId28"/>
+    <p:notesMasterId r:id="rId29"/>
   </p:notesMasterIdLst>
   <p:handoutMasterIdLst>
-    <p:handoutMasterId r:id="rId29"/>
+    <p:handoutMasterId r:id="rId30"/>
   </p:handoutMasterIdLst>
   <p:sldIdLst>
     <p:sldId id="261" r:id="rId3"/>
@@ -37,6 +37,7 @@
     <p:sldId id="275" r:id="rId25"/>
     <p:sldId id="281" r:id="rId26"/>
     <p:sldId id="276" r:id="rId27"/>
+    <p:sldId id="288" r:id="rId28"/>
   </p:sldIdLst>
   <p:sldSz cx="12192000" cy="6858000"/>
   <p:notesSz cx="6858000" cy="9144000"/>
@@ -228,7 +229,7 @@
           <a:p>
             <a:fld id="{8F591CCF-F6FD-734B-854A-5BC033593B1E}" type="datetimeFigureOut">
               <a:rPr lang="nl-NL" smtClean="0"/>
-              <a:t>22-9-2021</a:t>
+              <a:t>28-9-2021</a:t>
             </a:fld>
             <a:endParaRPr lang="nl-NL"/>
           </a:p>
@@ -393,7 +394,7 @@
           <a:p>
             <a:fld id="{23C66214-DB21-4647-B5DA-0D17CA592867}" type="datetimeFigureOut">
               <a:rPr lang="nl-NL" smtClean="0"/>
-              <a:t>22-9-2021</a:t>
+              <a:t>28-9-2021</a:t>
             </a:fld>
             <a:endParaRPr lang="nl-NL"/>
           </a:p>
@@ -1384,7 +1385,7 @@
           <a:p>
             <a:fld id="{2C71BA47-52C5-47BB-8222-E91DF5D20787}" type="datetime1">
               <a:rPr lang="nl-BE" smtClean="0"/>
-              <a:t>22/09/2021</a:t>
+              <a:t>28/09/2021</a:t>
             </a:fld>
             <a:endParaRPr lang="nl-NL"/>
           </a:p>
@@ -1668,7 +1669,7 @@
           <a:p>
             <a:fld id="{2FEB6D52-39FF-4DDC-ABA2-DD9B4669A9B6}" type="datetime1">
               <a:rPr lang="nl-BE" smtClean="0"/>
-              <a:t>22/09/2021</a:t>
+              <a:t>28/09/2021</a:t>
             </a:fld>
             <a:endParaRPr lang="nl-NL"/>
           </a:p>
@@ -2000,7 +2001,7 @@
           <a:p>
             <a:fld id="{92880460-E3E2-4A32-B010-8E868E7D8CFD}" type="datetime1">
               <a:rPr lang="nl-BE" smtClean="0"/>
-              <a:t>22/09/2021</a:t>
+              <a:t>28/09/2021</a:t>
             </a:fld>
             <a:endParaRPr lang="nl-NL"/>
           </a:p>
@@ -2321,7 +2322,7 @@
           <a:p>
             <a:fld id="{8BDB0A70-4029-4D60-9A27-8153D062C398}" type="datetime1">
               <a:rPr lang="nl-BE" smtClean="0"/>
-              <a:t>22/09/2021</a:t>
+              <a:t>28/09/2021</a:t>
             </a:fld>
             <a:endParaRPr lang="nl-NL" dirty="0"/>
           </a:p>
@@ -2643,7 +2644,7 @@
           <a:p>
             <a:fld id="{D191271C-0671-4065-B611-A85473029A3A}" type="datetime1">
               <a:rPr lang="nl-BE" smtClean="0"/>
-              <a:t>22/09/2021</a:t>
+              <a:t>28/09/2021</a:t>
             </a:fld>
             <a:endParaRPr lang="nl-NL" dirty="0"/>
           </a:p>
@@ -2786,7 +2787,7 @@
           <a:p>
             <a:fld id="{C2979C42-1016-4227-972D-D2170CB25ABA}" type="datetime1">
               <a:rPr lang="nl-BE" smtClean="0"/>
-              <a:t>22/09/2021</a:t>
+              <a:t>28/09/2021</a:t>
             </a:fld>
             <a:endParaRPr lang="nl-NL"/>
           </a:p>
@@ -3271,7 +3272,7 @@
           <a:p>
             <a:fld id="{C151225D-C070-4332-B04F-40B6DBB92F88}" type="datetime1">
               <a:rPr lang="nl-BE" smtClean="0"/>
-              <a:t>22/09/2021</a:t>
+              <a:t>28/09/2021</a:t>
             </a:fld>
             <a:endParaRPr lang="nl-NL" dirty="0"/>
           </a:p>
@@ -3393,7 +3394,7 @@
           <a:p>
             <a:fld id="{4765BD74-6176-4D14-A82C-CF7AA8CEE67B}" type="datetime1">
               <a:rPr lang="nl-BE" smtClean="0"/>
-              <a:t>22/09/2021</a:t>
+              <a:t>28/09/2021</a:t>
             </a:fld>
             <a:endParaRPr lang="nl-NL"/>
           </a:p>
@@ -3515,7 +3516,7 @@
           <a:p>
             <a:fld id="{A43878EE-CBAC-4D55-8B06-CB6D4F5064DA}" type="datetime1">
               <a:rPr lang="nl-BE" smtClean="0"/>
-              <a:t>22/09/2021</a:t>
+              <a:t>28/09/2021</a:t>
             </a:fld>
             <a:endParaRPr lang="nl-NL"/>
           </a:p>
@@ -3698,7 +3699,7 @@
           <a:p>
             <a:fld id="{81FE72EC-EE2C-486F-9DAA-1F302E3F0291}" type="datetime1">
               <a:rPr lang="nl-BE" smtClean="0"/>
-              <a:t>22/09/2021</a:t>
+              <a:t>28/09/2021</a:t>
             </a:fld>
             <a:endParaRPr lang="nl-NL" dirty="0"/>
           </a:p>
@@ -3985,7 +3986,7 @@
           <a:p>
             <a:fld id="{68B84DB0-B6A9-48D9-A086-A3E5FC5D790F}" type="datetime1">
               <a:rPr lang="nl-BE" smtClean="0"/>
-              <a:t>22/09/2021</a:t>
+              <a:t>28/09/2021</a:t>
             </a:fld>
             <a:endParaRPr lang="nl-NL" dirty="0"/>
           </a:p>
@@ -4628,7 +4629,7 @@
           <a:p>
             <a:fld id="{126EDFC9-25A4-4025-B417-B73F605F31CA}" type="datetime1">
               <a:rPr lang="nl-BE" smtClean="0"/>
-              <a:t>22/09/2021</a:t>
+              <a:t>28/09/2021</a:t>
             </a:fld>
             <a:endParaRPr lang="nl-NL" dirty="0"/>
           </a:p>
@@ -5468,6 +5469,13 @@
   <p:clrMapOvr>
     <a:masterClrMapping/>
   </p:clrMapOvr>
+  <p:timing>
+    <p:tnLst>
+      <p:par>
+        <p:cTn id="1" dur="indefinite" restart="never" nodeType="tmRoot"/>
+      </p:par>
+    </p:tnLst>
+  </p:timing>
 </p:sld>
 </file>
 
@@ -5667,7 +5675,25 @@
           <a:p>
             <a:r>
               <a:rPr lang="nl-NL" dirty="0" smtClean="0"/>
-              <a:t>Zie website</a:t>
+              <a:t>Zie </a:t>
+            </a:r>
+            <a:r>
+              <a:rPr lang="nl-NL" dirty="0" smtClean="0"/>
+              <a:t>website</a:t>
+            </a:r>
+          </a:p>
+          <a:p>
+            <a:r>
+              <a:rPr lang="nl-BE" b="1" dirty="0"/>
+              <a:t>Breng een maatschappelijk of ecologisch relevant probleem in je schoolomgeving in kaart of los het op a.d.h.v. </a:t>
+            </a:r>
+            <a:r>
+              <a:rPr lang="nl-BE" b="1" dirty="0" err="1"/>
+              <a:t>IoT</a:t>
+            </a:r>
+            <a:r>
+              <a:rPr lang="nl-BE" b="1" dirty="0"/>
+              <a:t> technologie.</a:t>
             </a:r>
             <a:endParaRPr lang="nl-BE" dirty="0"/>
           </a:p>
@@ -5881,6 +5907,13 @@
   <p:clrMapOvr>
     <a:masterClrMapping/>
   </p:clrMapOvr>
+  <p:timing>
+    <p:tnLst>
+      <p:par>
+        <p:cTn id="1" dur="indefinite" restart="never" nodeType="tmRoot"/>
+      </p:par>
+    </p:tnLst>
+  </p:timing>
 </p:sld>
 </file>
 
@@ -6063,6 +6096,13 @@
   <p:clrMapOvr>
     <a:masterClrMapping/>
   </p:clrMapOvr>
+  <p:timing>
+    <p:tnLst>
+      <p:par>
+        <p:cTn id="1" dur="indefinite" restart="never" nodeType="tmRoot"/>
+      </p:par>
+    </p:tnLst>
+  </p:timing>
 </p:sld>
 </file>
 
@@ -6378,7 +6418,7 @@
 </file>
 
 <file path=ppt/slides/slide18.xml><?xml version="1.0" encoding="utf-8"?>
-<p:sld xmlns:a="http://schemas.openxmlformats.org/drawingml/2006/main" xmlns:r="http://schemas.openxmlformats.org/officeDocument/2006/relationships" xmlns:p="http://schemas.openxmlformats.org/presentationml/2006/main">
+<p:sld xmlns:a="http://schemas.openxmlformats.org/drawingml/2006/main" xmlns:r="http://schemas.openxmlformats.org/officeDocument/2006/relationships" xmlns:p="http://schemas.openxmlformats.org/presentationml/2006/main" show="0">
   <p:cSld>
     <p:spTree>
       <p:nvGrpSpPr>
@@ -6739,6 +6779,14 @@
   <p:clrMapOvr>
     <a:masterClrMapping/>
   </p:clrMapOvr>
+  <mc:AlternateContent xmlns:mc="http://schemas.openxmlformats.org/markup-compatibility/2006">
+    <mc:Choice xmlns:p14="http://schemas.microsoft.com/office/powerpoint/2010/main" Requires="p14">
+      <p:transition spd="slow" p14:dur="2000"/>
+    </mc:Choice>
+    <mc:Fallback>
+      <p:transition spd="slow"/>
+    </mc:Fallback>
+  </mc:AlternateContent>
 </p:sld>
 </file>
 
@@ -7115,6 +7163,13 @@
   <p:clrMapOvr>
     <a:masterClrMapping/>
   </p:clrMapOvr>
+  <p:timing>
+    <p:tnLst>
+      <p:par>
+        <p:cTn id="1" dur="indefinite" restart="never" nodeType="tmRoot"/>
+      </p:par>
+    </p:tnLst>
+  </p:timing>
 </p:sld>
 </file>
 
@@ -7149,21 +7204,6 @@
         <p:txBody>
           <a:bodyPr/>
           <a:lstStyle/>
-          <a:p>
-            <a:r>
-              <a:rPr lang="nl-NL" dirty="0">
-                <a:hlinkClick r:id="rId2"/>
-              </a:rPr>
-              <a:t>Concept </a:t>
-            </a:r>
-            <a:r>
-              <a:rPr lang="nl-NL" dirty="0" smtClean="0">
-                <a:hlinkClick r:id="rId2"/>
-              </a:rPr>
-              <a:t>map</a:t>
-            </a:r>
-            <a:endParaRPr lang="nl-NL" dirty="0" smtClean="0"/>
-          </a:p>
           <a:p>
             <a:r>
               <a:rPr lang="nl-NL" dirty="0" smtClean="0"/>
@@ -7492,11 +7532,7 @@
           <a:p>
             <a:r>
               <a:rPr lang="nl-NL" dirty="0" smtClean="0"/>
-              <a:t>Hoe </a:t>
-            </a:r>
-            <a:r>
-              <a:rPr lang="nl-NL" dirty="0" smtClean="0"/>
-              <a:t>configureren</a:t>
+              <a:t>Hoe configureren</a:t>
             </a:r>
           </a:p>
           <a:p>
@@ -7504,7 +7540,6 @@
               <a:rPr lang="nl-NL" dirty="0" smtClean="0"/>
               <a:t>Installatie gateway: uitleg komt op handleiding voor leerkrachten</a:t>
             </a:r>
-            <a:endParaRPr lang="nl-NL" dirty="0" smtClean="0"/>
           </a:p>
         </p:txBody>
       </p:sp>
@@ -8078,6 +8113,143 @@
 </p:sld>
 </file>
 
+<file path=ppt/slides/slide26.xml><?xml version="1.0" encoding="utf-8"?>
+<p:sld xmlns:a="http://schemas.openxmlformats.org/drawingml/2006/main" xmlns:r="http://schemas.openxmlformats.org/officeDocument/2006/relationships" xmlns:p="http://schemas.openxmlformats.org/presentationml/2006/main">
+  <p:cSld>
+    <p:spTree>
+      <p:nvGrpSpPr>
+        <p:cNvPr id="1" name=""/>
+        <p:cNvGrpSpPr/>
+        <p:nvPr/>
+      </p:nvGrpSpPr>
+      <p:grpSpPr>
+        <a:xfrm>
+          <a:off x="0" y="0"/>
+          <a:ext cx="0" cy="0"/>
+          <a:chOff x="0" y="0"/>
+          <a:chExt cx="0" cy="0"/>
+        </a:xfrm>
+      </p:grpSpPr>
+      <p:sp>
+        <p:nvSpPr>
+          <p:cNvPr id="2" name="Tijdelijke aanduiding voor inhoud 1"/>
+          <p:cNvSpPr>
+            <a:spLocks noGrp="1"/>
+          </p:cNvSpPr>
+          <p:nvPr>
+            <p:ph idx="1"/>
+          </p:nvPr>
+        </p:nvSpPr>
+        <p:spPr/>
+        <p:txBody>
+          <a:bodyPr/>
+          <a:lstStyle/>
+          <a:p>
+            <a:r>
+              <a:rPr lang="nl-NL" dirty="0">
+                <a:hlinkClick r:id="rId2"/>
+              </a:rPr>
+              <a:t>Concept map</a:t>
+            </a:r>
+            <a:endParaRPr lang="nl-NL" dirty="0"/>
+          </a:p>
+          <a:p>
+            <a:r>
+              <a:rPr lang="nl-NL" dirty="0" smtClean="0"/>
+              <a:t>Bedenkingen/bemerkingen?</a:t>
+            </a:r>
+          </a:p>
+          <a:p>
+            <a:r>
+              <a:rPr lang="nl-NL" smtClean="0"/>
+              <a:t>Nog noden/vragen?</a:t>
+            </a:r>
+            <a:endParaRPr lang="nl-BE"/>
+          </a:p>
+        </p:txBody>
+      </p:sp>
+      <p:sp>
+        <p:nvSpPr>
+          <p:cNvPr id="3" name="Tijdelijke aanduiding voor voettekst 2"/>
+          <p:cNvSpPr>
+            <a:spLocks noGrp="1"/>
+          </p:cNvSpPr>
+          <p:nvPr>
+            <p:ph type="ftr" sz="quarter" idx="11"/>
+          </p:nvPr>
+        </p:nvSpPr>
+        <p:spPr/>
+        <p:txBody>
+          <a:bodyPr/>
+          <a:lstStyle/>
+          <a:p>
+            <a:r>
+              <a:rPr lang="nl-BE" smtClean="0"/>
+              <a:t>Technologiecampus Gent, faculteit Industriële Ingenieurswetenschappen</a:t>
+            </a:r>
+            <a:endParaRPr lang="nl-NL"/>
+          </a:p>
+        </p:txBody>
+      </p:sp>
+      <p:sp>
+        <p:nvSpPr>
+          <p:cNvPr id="4" name="Tijdelijke aanduiding voor dianummer 3"/>
+          <p:cNvSpPr>
+            <a:spLocks noGrp="1"/>
+          </p:cNvSpPr>
+          <p:nvPr>
+            <p:ph type="sldNum" sz="quarter" idx="12"/>
+          </p:nvPr>
+        </p:nvSpPr>
+        <p:spPr/>
+        <p:txBody>
+          <a:bodyPr/>
+          <a:lstStyle/>
+          <a:p>
+            <a:fld id="{0A297500-7527-634B-90F4-69D0994C32B4}" type="slidenum">
+              <a:rPr lang="nl-NL" smtClean="0"/>
+              <a:t>26</a:t>
+            </a:fld>
+            <a:endParaRPr lang="nl-NL"/>
+          </a:p>
+        </p:txBody>
+      </p:sp>
+      <p:sp>
+        <p:nvSpPr>
+          <p:cNvPr id="5" name="Titel 4"/>
+          <p:cNvSpPr>
+            <a:spLocks noGrp="1"/>
+          </p:cNvSpPr>
+          <p:nvPr>
+            <p:ph type="title"/>
+          </p:nvPr>
+        </p:nvSpPr>
+        <p:spPr/>
+        <p:txBody>
+          <a:bodyPr/>
+          <a:lstStyle/>
+          <a:p>
+            <a:r>
+              <a:rPr lang="nl-NL" dirty="0" smtClean="0"/>
+              <a:t>Reflectie en afsluit</a:t>
+            </a:r>
+            <a:endParaRPr lang="nl-BE" dirty="0"/>
+          </a:p>
+        </p:txBody>
+      </p:sp>
+    </p:spTree>
+    <p:extLst>
+      <p:ext uri="{BB962C8B-B14F-4D97-AF65-F5344CB8AC3E}">
+        <p14:creationId xmlns:p14="http://schemas.microsoft.com/office/powerpoint/2010/main" val="35329976"/>
+      </p:ext>
+    </p:extLst>
+  </p:cSld>
+  <p:clrMapOvr>
+    <a:masterClrMapping/>
+  </p:clrMapOvr>
+</p:sld>
+</file>
+
 <file path=ppt/slides/slide3.xml><?xml version="1.0" encoding="utf-8"?>
 <p:sld xmlns:a="http://schemas.openxmlformats.org/drawingml/2006/main" xmlns:r="http://schemas.openxmlformats.org/officeDocument/2006/relationships" xmlns:p="http://schemas.openxmlformats.org/presentationml/2006/main">
   <p:cSld>
@@ -8269,6 +8441,13 @@
   <p:clrMapOvr>
     <a:masterClrMapping/>
   </p:clrMapOvr>
+  <p:timing>
+    <p:tnLst>
+      <p:par>
+        <p:cTn id="1" dur="indefinite" restart="never" nodeType="tmRoot"/>
+      </p:par>
+    </p:tnLst>
+  </p:timing>
 </p:sld>
 </file>
 
@@ -8401,6 +8580,13 @@
   <p:clrMapOvr>
     <a:masterClrMapping/>
   </p:clrMapOvr>
+  <p:timing>
+    <p:tnLst>
+      <p:par>
+        <p:cTn id="1" dur="indefinite" restart="never" nodeType="tmRoot"/>
+      </p:par>
+    </p:tnLst>
+  </p:timing>
 </p:sld>
 </file>
 
@@ -8433,7 +8619,9 @@
         </p:nvSpPr>
         <p:spPr/>
         <p:txBody>
-          <a:bodyPr/>
+          <a:bodyPr>
+            <a:normAutofit lnSpcReduction="10000"/>
+          </a:bodyPr>
           <a:lstStyle/>
           <a:p>
             <a:r>
@@ -8451,7 +8639,27 @@
               <a:rPr lang="nl-NL" dirty="0" smtClean="0">
                 <a:hlinkClick r:id="rId2"/>
               </a:rPr>
-              <a:t>opleiding elektronica-ICT, industrieel ingenieur</a:t>
+              <a:t>opleiding elektronica-ICT, industrieel </a:t>
+            </a:r>
+            <a:r>
+              <a:rPr lang="nl-NL" dirty="0" smtClean="0">
+                <a:hlinkClick r:id="rId2"/>
+              </a:rPr>
+              <a:t>ingenieur</a:t>
+            </a:r>
+            <a:endParaRPr lang="nl-NL" dirty="0" smtClean="0"/>
+          </a:p>
+          <a:p>
+            <a:r>
+              <a:rPr lang="nl-NL" dirty="0" smtClean="0"/>
+              <a:t>Jullie?</a:t>
+            </a:r>
+          </a:p>
+          <a:p>
+            <a:pPr lvl="1"/>
+            <a:r>
+              <a:rPr lang="nl-NL" dirty="0" smtClean="0"/>
+              <a:t>Achtergrond, klas, verwachtingen?</a:t>
             </a:r>
             <a:endParaRPr lang="nl-NL" dirty="0" smtClean="0"/>
           </a:p>
@@ -8707,11 +8915,7 @@
           <a:p>
             <a:r>
               <a:rPr lang="nl-NL" dirty="0" smtClean="0"/>
-              <a:t>Kern-project </a:t>
-            </a:r>
-            <a:r>
-              <a:rPr lang="nl-NL" dirty="0" smtClean="0"/>
-              <a:t>met mogelijkheid dieper in te gaan op </a:t>
+              <a:t>Kern-project met mogelijkheid dieper in te gaan op </a:t>
             </a:r>
           </a:p>
           <a:p>
@@ -9254,6 +9458,13 @@
   <p:clrMapOvr>
     <a:masterClrMapping/>
   </p:clrMapOvr>
+  <p:timing>
+    <p:tnLst>
+      <p:par>
+        <p:cTn id="1" dur="indefinite" restart="never" nodeType="tmRoot"/>
+      </p:par>
+    </p:tnLst>
+  </p:timing>
 </p:sld>
 </file>
 
@@ -9441,6 +9652,13 @@
   <p:clrMapOvr>
     <a:masterClrMapping/>
   </p:clrMapOvr>
+  <p:timing>
+    <p:tnLst>
+      <p:par>
+        <p:cTn id="1" dur="indefinite" restart="never" nodeType="tmRoot"/>
+      </p:par>
+    </p:tnLst>
+  </p:timing>
 </p:sld>
 </file>
 
@@ -9801,6 +10019,13 @@
   <p:clrMapOvr>
     <a:masterClrMapping/>
   </p:clrMapOvr>
+  <p:timing>
+    <p:tnLst>
+      <p:par>
+        <p:cTn id="1" dur="indefinite" restart="never" nodeType="tmRoot"/>
+      </p:par>
+    </p:tnLst>
+  </p:timing>
 </p:sld>
 </file>
 

</xml_diff>